<commit_message>
update : ppt with studentId
</commit_message>
<xml_diff>
--- a/doc/HEALTH_N_CARE.pptx
+++ b/doc/HEALTH_N_CARE.pptx
@@ -17,7 +17,7 @@
     <p:sldId id="266" r:id="rId11"/>
     <p:sldId id="267" r:id="rId12"/>
     <p:sldId id="268" r:id="rId13"/>
-    <p:sldId id="270" r:id="rId14"/>
+    <p:sldId id="271" r:id="rId14"/>
   </p:sldIdLst>
   <p:sldSz cx="14401800" cy="7921625"/>
   <p:notesSz cx="6858000" cy="9144000"/>
@@ -116,6 +116,22 @@
       </a:defRPr>
     </a:lvl9pPr>
   </p:defaultTextStyle>
+  <p:extLst>
+    <p:ext uri="{EFAFB233-063F-42B5-8137-9DF3F51BA10A}">
+      <p15:sldGuideLst xmlns:p15="http://schemas.microsoft.com/office/powerpoint/2012/main">
+        <p15:guide id="1" orient="horz" pos="2496">
+          <p15:clr>
+            <a:srgbClr val="A4A3A4"/>
+          </p15:clr>
+        </p15:guide>
+        <p15:guide id="2" pos="4536">
+          <p15:clr>
+            <a:srgbClr val="A4A3A4"/>
+          </p15:clr>
+        </p15:guide>
+      </p15:sldGuideLst>
+    </p:ext>
+  </p:extLst>
 </p:presentation>
 </file>
 
@@ -199,9 +215,7 @@
         </p:style>
         <p:txBody>
           <a:bodyPr lIns="127553" tIns="63777" rIns="127553" bIns="63777" anchor="ctr"/>
-          <a:lstStyle>
-            <a:extLst/>
-          </a:lstStyle>
+          <a:lstStyle/>
           <a:p>
             <a:pPr algn="ctr" eaLnBrk="1" latinLnBrk="0" hangingPunct="1"/>
             <a:endParaRPr kumimoji="0" lang="en-US"/>
@@ -254,10 +268,9 @@
           </a:lstStyle>
           <a:p>
             <a:r>
-              <a:rPr kumimoji="0" lang="en-US" smtClean="0"/>
+              <a:rPr kumimoji="0" lang="en-US"/>
               <a:t>Click to edit Master title style</a:t>
             </a:r>
-            <a:endParaRPr kumimoji="0" lang="en-US"/>
           </a:p>
         </p:txBody>
       </p:sp>
@@ -316,10 +329,9 @@
           </a:lstStyle>
           <a:p>
             <a:r>
-              <a:rPr kumimoji="0" lang="en-US" smtClean="0"/>
+              <a:rPr kumimoji="0" lang="en-US"/>
               <a:t>Click to edit Master subtitle style</a:t>
             </a:r>
-            <a:endParaRPr kumimoji="0" lang="en-US"/>
           </a:p>
         </p:txBody>
       </p:sp>
@@ -414,9 +426,7 @@
           </p:spPr>
           <p:txBody>
             <a:bodyPr vert="horz" wrap="square" lIns="91440" tIns="45720" rIns="91440" bIns="45720" anchor="t" compatLnSpc="1"/>
-            <a:lstStyle>
-              <a:extLst/>
-            </a:lstStyle>
+            <a:lstStyle/>
             <a:p>
               <a:endParaRPr kumimoji="0" lang="en-US"/>
             </a:p>
@@ -496,9 +506,7 @@
           </p:spPr>
           <p:txBody>
             <a:bodyPr vert="horz" wrap="square" lIns="91440" tIns="45720" rIns="91440" bIns="45720" anchor="t" compatLnSpc="1"/>
-            <a:lstStyle>
-              <a:extLst/>
-            </a:lstStyle>
+            <a:lstStyle/>
             <a:p>
               <a:endParaRPr kumimoji="0" lang="en-US"/>
             </a:p>
@@ -655,9 +663,7 @@
           </p:style>
           <p:txBody>
             <a:bodyPr vert="horz" wrap="square" lIns="91440" tIns="45720" rIns="91440" bIns="45720" anchor="ctr" compatLnSpc="1"/>
-            <a:lstStyle>
-              <a:extLst/>
-            </a:lstStyle>
+            <a:lstStyle/>
             <a:p>
               <a:pPr algn="ctr" eaLnBrk="1" latinLnBrk="0" hangingPunct="1"/>
               <a:endParaRPr kumimoji="0" lang="en-US"/>
@@ -745,7 +751,7 @@
             <a:fld id="{CB6B527C-F8D3-46D9-A140-6DBA749C41A6}" type="datetimeFigureOut">
               <a:rPr lang="en-US" smtClean="0"/>
               <a:pPr/>
-              <a:t>12/9/2019</a:t>
+              <a:t>12/9/19</a:t>
             </a:fld>
             <a:endParaRPr lang="en-IN"/>
           </a:p>
@@ -852,15 +858,12 @@
         <p:spPr/>
         <p:txBody>
           <a:bodyPr/>
-          <a:lstStyle>
-            <a:extLst/>
-          </a:lstStyle>
-          <a:p>
-            <a:r>
-              <a:rPr kumimoji="0" lang="en-US" smtClean="0"/>
+          <a:lstStyle/>
+          <a:p>
+            <a:r>
+              <a:rPr kumimoji="0" lang="en-US"/>
               <a:t>Click to edit Master title style</a:t>
             </a:r>
-            <a:endParaRPr kumimoji="0" lang="en-US"/>
           </a:p>
         </p:txBody>
       </p:sp>
@@ -882,41 +885,39 @@
         </p:spPr>
         <p:txBody>
           <a:bodyPr vert="eaVert"/>
-          <a:lstStyle>
-            <a:extLst/>
-          </a:lstStyle>
+          <a:lstStyle/>
           <a:p>
             <a:pPr lvl="0" eaLnBrk="1" latinLnBrk="0" hangingPunct="1"/>
             <a:r>
-              <a:rPr lang="en-US" smtClean="0"/>
+              <a:rPr lang="en-US"/>
               <a:t>Click to edit Master text styles</a:t>
             </a:r>
           </a:p>
           <a:p>
             <a:pPr lvl="1" eaLnBrk="1" latinLnBrk="0" hangingPunct="1"/>
             <a:r>
-              <a:rPr lang="en-US" smtClean="0"/>
+              <a:rPr lang="en-US"/>
               <a:t>Second level</a:t>
             </a:r>
           </a:p>
           <a:p>
             <a:pPr lvl="2" eaLnBrk="1" latinLnBrk="0" hangingPunct="1"/>
             <a:r>
-              <a:rPr lang="en-US" smtClean="0"/>
+              <a:rPr lang="en-US"/>
               <a:t>Third level</a:t>
             </a:r>
           </a:p>
           <a:p>
             <a:pPr lvl="3" eaLnBrk="1" latinLnBrk="0" hangingPunct="1"/>
             <a:r>
-              <a:rPr lang="en-US" smtClean="0"/>
+              <a:rPr lang="en-US"/>
               <a:t>Fourth level</a:t>
             </a:r>
           </a:p>
           <a:p>
             <a:pPr lvl="4" eaLnBrk="1" latinLnBrk="0" hangingPunct="1"/>
             <a:r>
-              <a:rPr lang="en-US" smtClean="0"/>
+              <a:rPr lang="en-US"/>
               <a:t>Fifth level</a:t>
             </a:r>
             <a:endParaRPr kumimoji="0" lang="en-US"/>
@@ -936,14 +937,12 @@
         <p:spPr/>
         <p:txBody>
           <a:bodyPr/>
-          <a:lstStyle>
-            <a:extLst/>
-          </a:lstStyle>
+          <a:lstStyle/>
           <a:p>
             <a:fld id="{CB6B527C-F8D3-46D9-A140-6DBA749C41A6}" type="datetimeFigureOut">
               <a:rPr lang="en-US" smtClean="0"/>
               <a:pPr/>
-              <a:t>12/9/2019</a:t>
+              <a:t>12/9/19</a:t>
             </a:fld>
             <a:endParaRPr lang="en-IN"/>
           </a:p>
@@ -962,9 +961,7 @@
         <p:spPr/>
         <p:txBody>
           <a:bodyPr/>
-          <a:lstStyle>
-            <a:extLst/>
-          </a:lstStyle>
+          <a:lstStyle/>
           <a:p>
             <a:endParaRPr lang="en-IN"/>
           </a:p>
@@ -983,9 +980,7 @@
         <p:spPr/>
         <p:txBody>
           <a:bodyPr/>
-          <a:lstStyle>
-            <a:extLst/>
-          </a:lstStyle>
+          <a:lstStyle/>
           <a:p>
             <a:fld id="{01DD7742-DE02-414E-8F11-3D7542489CAE}" type="slidenum">
               <a:rPr lang="en-IN" smtClean="0"/>
@@ -1039,15 +1034,12 @@
         </p:spPr>
         <p:txBody>
           <a:bodyPr vert="eaVert"/>
-          <a:lstStyle>
-            <a:extLst/>
-          </a:lstStyle>
-          <a:p>
-            <a:r>
-              <a:rPr kumimoji="0" lang="en-US" smtClean="0"/>
+          <a:lstStyle/>
+          <a:p>
+            <a:r>
+              <a:rPr kumimoji="0" lang="en-US"/>
               <a:t>Click to edit Master title style</a:t>
             </a:r>
-            <a:endParaRPr kumimoji="0" lang="en-US"/>
           </a:p>
         </p:txBody>
       </p:sp>
@@ -1069,41 +1061,39 @@
         </p:spPr>
         <p:txBody>
           <a:bodyPr vert="eaVert"/>
-          <a:lstStyle>
-            <a:extLst/>
-          </a:lstStyle>
+          <a:lstStyle/>
           <a:p>
             <a:pPr lvl="0" eaLnBrk="1" latinLnBrk="0" hangingPunct="1"/>
             <a:r>
-              <a:rPr lang="en-US" smtClean="0"/>
+              <a:rPr lang="en-US"/>
               <a:t>Click to edit Master text styles</a:t>
             </a:r>
           </a:p>
           <a:p>
             <a:pPr lvl="1" eaLnBrk="1" latinLnBrk="0" hangingPunct="1"/>
             <a:r>
-              <a:rPr lang="en-US" smtClean="0"/>
+              <a:rPr lang="en-US"/>
               <a:t>Second level</a:t>
             </a:r>
           </a:p>
           <a:p>
             <a:pPr lvl="2" eaLnBrk="1" latinLnBrk="0" hangingPunct="1"/>
             <a:r>
-              <a:rPr lang="en-US" smtClean="0"/>
+              <a:rPr lang="en-US"/>
               <a:t>Third level</a:t>
             </a:r>
           </a:p>
           <a:p>
             <a:pPr lvl="3" eaLnBrk="1" latinLnBrk="0" hangingPunct="1"/>
             <a:r>
-              <a:rPr lang="en-US" smtClean="0"/>
+              <a:rPr lang="en-US"/>
               <a:t>Fourth level</a:t>
             </a:r>
           </a:p>
           <a:p>
             <a:pPr lvl="4" eaLnBrk="1" latinLnBrk="0" hangingPunct="1"/>
             <a:r>
-              <a:rPr lang="en-US" smtClean="0"/>
+              <a:rPr lang="en-US"/>
               <a:t>Fifth level</a:t>
             </a:r>
             <a:endParaRPr kumimoji="0" lang="en-US"/>
@@ -1123,14 +1113,12 @@
         <p:spPr/>
         <p:txBody>
           <a:bodyPr/>
-          <a:lstStyle>
-            <a:extLst/>
-          </a:lstStyle>
+          <a:lstStyle/>
           <a:p>
             <a:fld id="{CB6B527C-F8D3-46D9-A140-6DBA749C41A6}" type="datetimeFigureOut">
               <a:rPr lang="en-US" smtClean="0"/>
               <a:pPr/>
-              <a:t>12/9/2019</a:t>
+              <a:t>12/9/19</a:t>
             </a:fld>
             <a:endParaRPr lang="en-IN"/>
           </a:p>
@@ -1149,9 +1137,7 @@
         <p:spPr/>
         <p:txBody>
           <a:bodyPr/>
-          <a:lstStyle>
-            <a:extLst/>
-          </a:lstStyle>
+          <a:lstStyle/>
           <a:p>
             <a:endParaRPr lang="en-IN"/>
           </a:p>
@@ -1170,9 +1156,7 @@
         <p:spPr/>
         <p:txBody>
           <a:bodyPr/>
-          <a:lstStyle>
-            <a:extLst/>
-          </a:lstStyle>
+          <a:lstStyle/>
           <a:p>
             <a:fld id="{01DD7742-DE02-414E-8F11-3D7542489CAE}" type="slidenum">
               <a:rPr lang="en-IN" smtClean="0"/>
@@ -1221,41 +1205,39 @@
         <p:spPr/>
         <p:txBody>
           <a:bodyPr/>
-          <a:lstStyle>
-            <a:extLst/>
-          </a:lstStyle>
+          <a:lstStyle/>
           <a:p>
             <a:pPr lvl="0" eaLnBrk="1" latinLnBrk="0" hangingPunct="1"/>
             <a:r>
-              <a:rPr lang="en-US" smtClean="0"/>
+              <a:rPr lang="en-US"/>
               <a:t>Click to edit Master text styles</a:t>
             </a:r>
           </a:p>
           <a:p>
             <a:pPr lvl="1" eaLnBrk="1" latinLnBrk="0" hangingPunct="1"/>
             <a:r>
-              <a:rPr lang="en-US" smtClean="0"/>
+              <a:rPr lang="en-US"/>
               <a:t>Second level</a:t>
             </a:r>
           </a:p>
           <a:p>
             <a:pPr lvl="2" eaLnBrk="1" latinLnBrk="0" hangingPunct="1"/>
             <a:r>
-              <a:rPr lang="en-US" smtClean="0"/>
+              <a:rPr lang="en-US"/>
               <a:t>Third level</a:t>
             </a:r>
           </a:p>
           <a:p>
             <a:pPr lvl="3" eaLnBrk="1" latinLnBrk="0" hangingPunct="1"/>
             <a:r>
-              <a:rPr lang="en-US" smtClean="0"/>
+              <a:rPr lang="en-US"/>
               <a:t>Fourth level</a:t>
             </a:r>
           </a:p>
           <a:p>
             <a:pPr lvl="4" eaLnBrk="1" latinLnBrk="0" hangingPunct="1"/>
             <a:r>
-              <a:rPr lang="en-US" smtClean="0"/>
+              <a:rPr lang="en-US"/>
               <a:t>Fifth level</a:t>
             </a:r>
             <a:endParaRPr kumimoji="0" lang="en-US"/>
@@ -1275,14 +1257,12 @@
         <p:spPr/>
         <p:txBody>
           <a:bodyPr/>
-          <a:lstStyle>
-            <a:extLst/>
-          </a:lstStyle>
+          <a:lstStyle/>
           <a:p>
             <a:fld id="{CB6B527C-F8D3-46D9-A140-6DBA749C41A6}" type="datetimeFigureOut">
               <a:rPr lang="en-US" smtClean="0"/>
               <a:pPr/>
-              <a:t>12/9/2019</a:t>
+              <a:t>12/9/19</a:t>
             </a:fld>
             <a:endParaRPr lang="en-IN"/>
           </a:p>
@@ -1301,9 +1281,7 @@
         <p:spPr/>
         <p:txBody>
           <a:bodyPr/>
-          <a:lstStyle>
-            <a:extLst/>
-          </a:lstStyle>
+          <a:lstStyle/>
           <a:p>
             <a:endParaRPr lang="en-IN"/>
           </a:p>
@@ -1322,9 +1300,7 @@
         <p:spPr/>
         <p:txBody>
           <a:bodyPr/>
-          <a:lstStyle>
-            <a:extLst/>
-          </a:lstStyle>
+          <a:lstStyle/>
           <a:p>
             <a:fld id="{01DD7742-DE02-414E-8F11-3D7542489CAE}" type="slidenum">
               <a:rPr lang="en-IN" smtClean="0"/>
@@ -1348,15 +1324,12 @@
         <p:spPr/>
         <p:txBody>
           <a:bodyPr rtlCol="0"/>
-          <a:lstStyle>
-            <a:extLst/>
-          </a:lstStyle>
-          <a:p>
-            <a:r>
-              <a:rPr kumimoji="0" lang="en-US" smtClean="0"/>
+          <a:lstStyle/>
+          <a:p>
+            <a:r>
+              <a:rPr kumimoji="0" lang="en-US"/>
               <a:t>Click to edit Master title style</a:t>
             </a:r>
-            <a:endParaRPr kumimoji="0" lang="en-US"/>
           </a:p>
         </p:txBody>
       </p:sp>
@@ -1434,10 +1407,9 @@
           </a:lstStyle>
           <a:p>
             <a:r>
-              <a:rPr kumimoji="0" lang="en-US" smtClean="0"/>
+              <a:rPr kumimoji="0" lang="en-US"/>
               <a:t>Click to edit Master title style</a:t>
             </a:r>
-            <a:endParaRPr kumimoji="0" lang="en-US"/>
           </a:p>
         </p:txBody>
       </p:sp>
@@ -1513,7 +1485,7 @@
           <a:p>
             <a:pPr lvl="0" eaLnBrk="1" latinLnBrk="0" hangingPunct="1"/>
             <a:r>
-              <a:rPr kumimoji="0" lang="en-US" smtClean="0"/>
+              <a:rPr kumimoji="0" lang="en-US"/>
               <a:t>Click to edit Master text styles</a:t>
             </a:r>
           </a:p>
@@ -1532,14 +1504,12 @@
         <p:spPr/>
         <p:txBody>
           <a:bodyPr/>
-          <a:lstStyle>
-            <a:extLst/>
-          </a:lstStyle>
+          <a:lstStyle/>
           <a:p>
             <a:fld id="{CB6B527C-F8D3-46D9-A140-6DBA749C41A6}" type="datetimeFigureOut">
               <a:rPr lang="en-US" smtClean="0"/>
               <a:pPr/>
-              <a:t>12/9/2019</a:t>
+              <a:t>12/9/19</a:t>
             </a:fld>
             <a:endParaRPr lang="en-IN"/>
           </a:p>
@@ -1558,9 +1528,7 @@
         <p:spPr/>
         <p:txBody>
           <a:bodyPr/>
-          <a:lstStyle>
-            <a:extLst/>
-          </a:lstStyle>
+          <a:lstStyle/>
           <a:p>
             <a:endParaRPr lang="en-IN"/>
           </a:p>
@@ -1579,9 +1547,7 @@
         <p:spPr/>
         <p:txBody>
           <a:bodyPr/>
-          <a:lstStyle>
-            <a:extLst/>
-          </a:lstStyle>
+          <a:lstStyle/>
           <a:p>
             <a:fld id="{01DD7742-DE02-414E-8F11-3D7542489CAE}" type="slidenum">
               <a:rPr lang="en-IN" smtClean="0"/>
@@ -1663,9 +1629,7 @@
         </p:style>
         <p:txBody>
           <a:bodyPr lIns="127553" tIns="63777" rIns="127553" bIns="63777" anchor="ctr"/>
-          <a:lstStyle>
-            <a:extLst/>
-          </a:lstStyle>
+          <a:lstStyle/>
           <a:p>
             <a:pPr algn="l" eaLnBrk="1" latinLnBrk="0" hangingPunct="1"/>
             <a:endParaRPr kumimoji="0" lang="en-US"/>
@@ -1743,9 +1707,7 @@
         </p:style>
         <p:txBody>
           <a:bodyPr lIns="127553" tIns="63777" rIns="127553" bIns="63777" anchor="ctr"/>
-          <a:lstStyle>
-            <a:extLst/>
-          </a:lstStyle>
+          <a:lstStyle/>
           <a:p>
             <a:pPr algn="l" eaLnBrk="1" latinLnBrk="0" hangingPunct="1"/>
             <a:endParaRPr kumimoji="0" lang="en-US"/>
@@ -1821,35 +1783,35 @@
           <a:p>
             <a:pPr lvl="0" eaLnBrk="1" latinLnBrk="0" hangingPunct="1"/>
             <a:r>
-              <a:rPr lang="en-US" smtClean="0"/>
+              <a:rPr lang="en-US"/>
               <a:t>Click to edit Master text styles</a:t>
             </a:r>
           </a:p>
           <a:p>
             <a:pPr lvl="1" eaLnBrk="1" latinLnBrk="0" hangingPunct="1"/>
             <a:r>
-              <a:rPr lang="en-US" smtClean="0"/>
+              <a:rPr lang="en-US"/>
               <a:t>Second level</a:t>
             </a:r>
           </a:p>
           <a:p>
             <a:pPr lvl="2" eaLnBrk="1" latinLnBrk="0" hangingPunct="1"/>
             <a:r>
-              <a:rPr lang="en-US" smtClean="0"/>
+              <a:rPr lang="en-US"/>
               <a:t>Third level</a:t>
             </a:r>
           </a:p>
           <a:p>
             <a:pPr lvl="3" eaLnBrk="1" latinLnBrk="0" hangingPunct="1"/>
             <a:r>
-              <a:rPr lang="en-US" smtClean="0"/>
+              <a:rPr lang="en-US"/>
               <a:t>Fourth level</a:t>
             </a:r>
           </a:p>
           <a:p>
             <a:pPr lvl="4" eaLnBrk="1" latinLnBrk="0" hangingPunct="1"/>
             <a:r>
-              <a:rPr lang="en-US" smtClean="0"/>
+              <a:rPr lang="en-US"/>
               <a:t>Fifth level</a:t>
             </a:r>
             <a:endParaRPr kumimoji="0" lang="en-US"/>
@@ -1895,35 +1857,35 @@
           <a:p>
             <a:pPr lvl="0" eaLnBrk="1" latinLnBrk="0" hangingPunct="1"/>
             <a:r>
-              <a:rPr lang="en-US" smtClean="0"/>
+              <a:rPr lang="en-US"/>
               <a:t>Click to edit Master text styles</a:t>
             </a:r>
           </a:p>
           <a:p>
             <a:pPr lvl="1" eaLnBrk="1" latinLnBrk="0" hangingPunct="1"/>
             <a:r>
-              <a:rPr lang="en-US" smtClean="0"/>
+              <a:rPr lang="en-US"/>
               <a:t>Second level</a:t>
             </a:r>
           </a:p>
           <a:p>
             <a:pPr lvl="2" eaLnBrk="1" latinLnBrk="0" hangingPunct="1"/>
             <a:r>
-              <a:rPr lang="en-US" smtClean="0"/>
+              <a:rPr lang="en-US"/>
               <a:t>Third level</a:t>
             </a:r>
           </a:p>
           <a:p>
             <a:pPr lvl="3" eaLnBrk="1" latinLnBrk="0" hangingPunct="1"/>
             <a:r>
-              <a:rPr lang="en-US" smtClean="0"/>
+              <a:rPr lang="en-US"/>
               <a:t>Fourth level</a:t>
             </a:r>
           </a:p>
           <a:p>
             <a:pPr lvl="4" eaLnBrk="1" latinLnBrk="0" hangingPunct="1"/>
             <a:r>
-              <a:rPr lang="en-US" smtClean="0"/>
+              <a:rPr lang="en-US"/>
               <a:t>Fifth level</a:t>
             </a:r>
             <a:endParaRPr kumimoji="0" lang="en-US"/>
@@ -1943,14 +1905,12 @@
         <p:spPr/>
         <p:txBody>
           <a:bodyPr/>
-          <a:lstStyle>
-            <a:extLst/>
-          </a:lstStyle>
+          <a:lstStyle/>
           <a:p>
             <a:fld id="{CB6B527C-F8D3-46D9-A140-6DBA749C41A6}" type="datetimeFigureOut">
               <a:rPr lang="en-US" smtClean="0"/>
               <a:pPr/>
-              <a:t>12/9/2019</a:t>
+              <a:t>12/9/19</a:t>
             </a:fld>
             <a:endParaRPr lang="en-IN"/>
           </a:p>
@@ -1969,9 +1929,7 @@
         <p:spPr/>
         <p:txBody>
           <a:bodyPr/>
-          <a:lstStyle>
-            <a:extLst/>
-          </a:lstStyle>
+          <a:lstStyle/>
           <a:p>
             <a:endParaRPr lang="en-IN"/>
           </a:p>
@@ -1990,9 +1948,7 @@
         <p:spPr/>
         <p:txBody>
           <a:bodyPr/>
-          <a:lstStyle>
-            <a:extLst/>
-          </a:lstStyle>
+          <a:lstStyle/>
           <a:p>
             <a:fld id="{01DD7742-DE02-414E-8F11-3D7542489CAE}" type="slidenum">
               <a:rPr lang="en-IN" smtClean="0"/>
@@ -2016,15 +1972,12 @@
         <p:spPr/>
         <p:txBody>
           <a:bodyPr rtlCol="0"/>
-          <a:lstStyle>
-            <a:extLst/>
-          </a:lstStyle>
-          <a:p>
-            <a:r>
-              <a:rPr kumimoji="0" lang="en-US" smtClean="0"/>
+          <a:lstStyle/>
+          <a:p>
+            <a:r>
+              <a:rPr kumimoji="0" lang="en-US"/>
               <a:t>Click to edit Master title style</a:t>
             </a:r>
-            <a:endParaRPr kumimoji="0" lang="en-US"/>
           </a:p>
         </p:txBody>
       </p:sp>
@@ -2084,10 +2037,9 @@
           </a:lstStyle>
           <a:p>
             <a:r>
-              <a:rPr kumimoji="0" lang="en-US" smtClean="0"/>
+              <a:rPr kumimoji="0" lang="en-US"/>
               <a:t>Click to edit Master title style</a:t>
             </a:r>
-            <a:endParaRPr kumimoji="0" lang="en-US"/>
           </a:p>
         </p:txBody>
       </p:sp>
@@ -2148,7 +2100,7 @@
           <a:p>
             <a:pPr lvl="0" eaLnBrk="1" latinLnBrk="0" hangingPunct="1"/>
             <a:r>
-              <a:rPr kumimoji="0" lang="en-US" smtClean="0"/>
+              <a:rPr kumimoji="0" lang="en-US"/>
               <a:t>Click to edit Master text styles</a:t>
             </a:r>
           </a:p>
@@ -2211,7 +2163,7 @@
           <a:p>
             <a:pPr lvl="0" eaLnBrk="1" latinLnBrk="0" hangingPunct="1"/>
             <a:r>
-              <a:rPr kumimoji="0" lang="en-US" smtClean="0"/>
+              <a:rPr kumimoji="0" lang="en-US"/>
               <a:t>Click to edit Master text styles</a:t>
             </a:r>
           </a:p>
@@ -2261,35 +2213,35 @@
           <a:p>
             <a:pPr lvl="0" eaLnBrk="1" latinLnBrk="0" hangingPunct="1"/>
             <a:r>
-              <a:rPr lang="en-US" smtClean="0"/>
+              <a:rPr lang="en-US"/>
               <a:t>Click to edit Master text styles</a:t>
             </a:r>
           </a:p>
           <a:p>
             <a:pPr lvl="1" eaLnBrk="1" latinLnBrk="0" hangingPunct="1"/>
             <a:r>
-              <a:rPr lang="en-US" smtClean="0"/>
+              <a:rPr lang="en-US"/>
               <a:t>Second level</a:t>
             </a:r>
           </a:p>
           <a:p>
             <a:pPr lvl="2" eaLnBrk="1" latinLnBrk="0" hangingPunct="1"/>
             <a:r>
-              <a:rPr lang="en-US" smtClean="0"/>
+              <a:rPr lang="en-US"/>
               <a:t>Third level</a:t>
             </a:r>
           </a:p>
           <a:p>
             <a:pPr lvl="3" eaLnBrk="1" latinLnBrk="0" hangingPunct="1"/>
             <a:r>
-              <a:rPr lang="en-US" smtClean="0"/>
+              <a:rPr lang="en-US"/>
               <a:t>Fourth level</a:t>
             </a:r>
           </a:p>
           <a:p>
             <a:pPr lvl="4" eaLnBrk="1" latinLnBrk="0" hangingPunct="1"/>
             <a:r>
-              <a:rPr lang="en-US" smtClean="0"/>
+              <a:rPr lang="en-US"/>
               <a:t>Fifth level</a:t>
             </a:r>
             <a:endParaRPr kumimoji="0" lang="en-US"/>
@@ -2343,35 +2295,35 @@
           <a:p>
             <a:pPr lvl="0" eaLnBrk="1" latinLnBrk="0" hangingPunct="1"/>
             <a:r>
-              <a:rPr lang="en-US" smtClean="0"/>
+              <a:rPr lang="en-US"/>
               <a:t>Click to edit Master text styles</a:t>
             </a:r>
           </a:p>
           <a:p>
             <a:pPr lvl="1" eaLnBrk="1" latinLnBrk="0" hangingPunct="1"/>
             <a:r>
-              <a:rPr lang="en-US" smtClean="0"/>
+              <a:rPr lang="en-US"/>
               <a:t>Second level</a:t>
             </a:r>
           </a:p>
           <a:p>
             <a:pPr lvl="2" eaLnBrk="1" latinLnBrk="0" hangingPunct="1"/>
             <a:r>
-              <a:rPr lang="en-US" smtClean="0"/>
+              <a:rPr lang="en-US"/>
               <a:t>Third level</a:t>
             </a:r>
           </a:p>
           <a:p>
             <a:pPr lvl="3" eaLnBrk="1" latinLnBrk="0" hangingPunct="1"/>
             <a:r>
-              <a:rPr lang="en-US" smtClean="0"/>
+              <a:rPr lang="en-US"/>
               <a:t>Fourth level</a:t>
             </a:r>
           </a:p>
           <a:p>
             <a:pPr lvl="4" eaLnBrk="1" latinLnBrk="0" hangingPunct="1"/>
             <a:r>
-              <a:rPr lang="en-US" smtClean="0"/>
+              <a:rPr lang="en-US"/>
               <a:t>Fifth level</a:t>
             </a:r>
             <a:endParaRPr kumimoji="0" lang="en-US"/>
@@ -2391,14 +2343,12 @@
         <p:spPr/>
         <p:txBody>
           <a:bodyPr/>
-          <a:lstStyle>
-            <a:extLst/>
-          </a:lstStyle>
+          <a:lstStyle/>
           <a:p>
             <a:fld id="{CB6B527C-F8D3-46D9-A140-6DBA749C41A6}" type="datetimeFigureOut">
               <a:rPr lang="en-US" smtClean="0"/>
               <a:pPr/>
-              <a:t>12/9/2019</a:t>
+              <a:t>12/9/19</a:t>
             </a:fld>
             <a:endParaRPr lang="en-IN"/>
           </a:p>
@@ -2417,9 +2367,7 @@
         <p:spPr/>
         <p:txBody>
           <a:bodyPr/>
-          <a:lstStyle>
-            <a:extLst/>
-          </a:lstStyle>
+          <a:lstStyle/>
           <a:p>
             <a:endParaRPr lang="en-IN"/>
           </a:p>
@@ -2438,9 +2386,7 @@
         <p:spPr/>
         <p:txBody>
           <a:bodyPr/>
-          <a:lstStyle>
-            <a:extLst/>
-          </a:lstStyle>
+          <a:lstStyle/>
           <a:p>
             <a:fld id="{01DD7742-DE02-414E-8F11-3D7542489CAE}" type="slidenum">
               <a:rPr lang="en-IN" smtClean="0"/>
@@ -2494,14 +2440,12 @@
         <p:spPr/>
         <p:txBody>
           <a:bodyPr/>
-          <a:lstStyle>
-            <a:extLst/>
-          </a:lstStyle>
+          <a:lstStyle/>
           <a:p>
             <a:fld id="{CB6B527C-F8D3-46D9-A140-6DBA749C41A6}" type="datetimeFigureOut">
               <a:rPr lang="en-US" smtClean="0"/>
               <a:pPr/>
-              <a:t>12/9/2019</a:t>
+              <a:t>12/9/19</a:t>
             </a:fld>
             <a:endParaRPr lang="en-IN"/>
           </a:p>
@@ -2520,9 +2464,7 @@
         <p:spPr/>
         <p:txBody>
           <a:bodyPr/>
-          <a:lstStyle>
-            <a:extLst/>
-          </a:lstStyle>
+          <a:lstStyle/>
           <a:p>
             <a:endParaRPr lang="en-IN"/>
           </a:p>
@@ -2541,9 +2483,7 @@
         <p:spPr/>
         <p:txBody>
           <a:bodyPr/>
-          <a:lstStyle>
-            <a:extLst/>
-          </a:lstStyle>
+          <a:lstStyle/>
           <a:p>
             <a:fld id="{01DD7742-DE02-414E-8F11-3D7542489CAE}" type="slidenum">
               <a:rPr lang="en-IN" smtClean="0"/>
@@ -2567,15 +2507,12 @@
         <p:spPr/>
         <p:txBody>
           <a:bodyPr rtlCol="0"/>
-          <a:lstStyle>
-            <a:extLst/>
-          </a:lstStyle>
-          <a:p>
-            <a:r>
-              <a:rPr kumimoji="0" lang="en-US" smtClean="0"/>
+          <a:lstStyle/>
+          <a:p>
+            <a:r>
+              <a:rPr kumimoji="0" lang="en-US"/>
               <a:t>Click to edit Master title style</a:t>
             </a:r>
-            <a:endParaRPr kumimoji="0" lang="en-US"/>
           </a:p>
         </p:txBody>
       </p:sp>
@@ -2617,14 +2554,12 @@
         <p:spPr/>
         <p:txBody>
           <a:bodyPr/>
-          <a:lstStyle>
-            <a:extLst/>
-          </a:lstStyle>
+          <a:lstStyle/>
           <a:p>
             <a:fld id="{CB6B527C-F8D3-46D9-A140-6DBA749C41A6}" type="datetimeFigureOut">
               <a:rPr lang="en-US" smtClean="0"/>
               <a:pPr/>
-              <a:t>12/9/2019</a:t>
+              <a:t>12/9/19</a:t>
             </a:fld>
             <a:endParaRPr lang="en-IN"/>
           </a:p>
@@ -2643,9 +2578,7 @@
         <p:spPr/>
         <p:txBody>
           <a:bodyPr/>
-          <a:lstStyle>
-            <a:extLst/>
-          </a:lstStyle>
+          <a:lstStyle/>
           <a:p>
             <a:endParaRPr lang="en-IN"/>
           </a:p>
@@ -2664,9 +2597,7 @@
         <p:spPr/>
         <p:txBody>
           <a:bodyPr/>
-          <a:lstStyle>
-            <a:extLst/>
-          </a:lstStyle>
+          <a:lstStyle/>
           <a:p>
             <a:fld id="{01DD7742-DE02-414E-8F11-3D7542489CAE}" type="slidenum">
               <a:rPr lang="en-IN" smtClean="0"/>
@@ -2744,10 +2675,9 @@
           </a:lstStyle>
           <a:p>
             <a:r>
-              <a:rPr kumimoji="0" lang="en-US" smtClean="0"/>
+              <a:rPr kumimoji="0" lang="en-US"/>
               <a:t>Click to edit Master title style</a:t>
             </a:r>
-            <a:endParaRPr kumimoji="0" lang="en-US"/>
           </a:p>
         </p:txBody>
       </p:sp>
@@ -2795,7 +2725,7 @@
           <a:p>
             <a:pPr lvl="0" eaLnBrk="1" latinLnBrk="0" hangingPunct="1"/>
             <a:r>
-              <a:rPr kumimoji="0" lang="en-US" smtClean="0"/>
+              <a:rPr kumimoji="0" lang="en-US"/>
               <a:t>Click to edit Master text styles</a:t>
             </a:r>
           </a:p>
@@ -2840,35 +2770,35 @@
           <a:p>
             <a:pPr lvl="0" eaLnBrk="1" latinLnBrk="0" hangingPunct="1"/>
             <a:r>
-              <a:rPr lang="en-US" smtClean="0"/>
+              <a:rPr lang="en-US"/>
               <a:t>Click to edit Master text styles</a:t>
             </a:r>
           </a:p>
           <a:p>
             <a:pPr lvl="1" eaLnBrk="1" latinLnBrk="0" hangingPunct="1"/>
             <a:r>
-              <a:rPr lang="en-US" smtClean="0"/>
+              <a:rPr lang="en-US"/>
               <a:t>Second level</a:t>
             </a:r>
           </a:p>
           <a:p>
             <a:pPr lvl="2" eaLnBrk="1" latinLnBrk="0" hangingPunct="1"/>
             <a:r>
-              <a:rPr lang="en-US" smtClean="0"/>
+              <a:rPr lang="en-US"/>
               <a:t>Third level</a:t>
             </a:r>
           </a:p>
           <a:p>
             <a:pPr lvl="3" eaLnBrk="1" latinLnBrk="0" hangingPunct="1"/>
             <a:r>
-              <a:rPr lang="en-US" smtClean="0"/>
+              <a:rPr lang="en-US"/>
               <a:t>Fourth level</a:t>
             </a:r>
           </a:p>
           <a:p>
             <a:pPr lvl="4" eaLnBrk="1" latinLnBrk="0" hangingPunct="1"/>
             <a:r>
-              <a:rPr lang="en-US" smtClean="0"/>
+              <a:rPr lang="en-US"/>
               <a:t>Fifth level</a:t>
             </a:r>
             <a:endParaRPr kumimoji="0" lang="en-US"/>
@@ -2893,14 +2823,12 @@
         </p:spPr>
         <p:txBody>
           <a:bodyPr/>
-          <a:lstStyle>
-            <a:extLst/>
-          </a:lstStyle>
+          <a:lstStyle/>
           <a:p>
             <a:fld id="{CB6B527C-F8D3-46D9-A140-6DBA749C41A6}" type="datetimeFigureOut">
               <a:rPr lang="en-US" smtClean="0"/>
               <a:pPr/>
-              <a:t>12/9/2019</a:t>
+              <a:t>12/9/19</a:t>
             </a:fld>
             <a:endParaRPr lang="en-IN"/>
           </a:p>
@@ -2919,9 +2847,7 @@
         <p:spPr/>
         <p:txBody>
           <a:bodyPr/>
-          <a:lstStyle>
-            <a:extLst/>
-          </a:lstStyle>
+          <a:lstStyle/>
           <a:p>
             <a:endParaRPr lang="en-IN"/>
           </a:p>
@@ -2940,9 +2866,7 @@
         <p:spPr/>
         <p:txBody>
           <a:bodyPr/>
-          <a:lstStyle>
-            <a:extLst/>
-          </a:lstStyle>
+          <a:lstStyle/>
           <a:p>
             <a:fld id="{01DD7742-DE02-414E-8F11-3D7542489CAE}" type="slidenum">
               <a:rPr lang="en-IN" smtClean="0"/>
@@ -3024,7 +2948,7 @@
           <a:p>
             <a:pPr lvl="0" eaLnBrk="1" latinLnBrk="0" hangingPunct="1"/>
             <a:r>
-              <a:rPr kumimoji="0" lang="en-US" smtClean="0"/>
+              <a:rPr kumimoji="0" lang="en-US"/>
               <a:t>Click to edit Master text styles</a:t>
             </a:r>
           </a:p>
@@ -3073,7 +2997,7 @@
           </a:lstStyle>
           <a:p>
             <a:r>
-              <a:rPr kumimoji="0" lang="en-US" smtClean="0"/>
+              <a:rPr kumimoji="0" lang="en-US"/>
               <a:t>Click icon to add picture</a:t>
             </a:r>
             <a:endParaRPr kumimoji="0" lang="en-US" dirty="0"/>
@@ -3107,7 +3031,7 @@
             <a:fld id="{CB6B527C-F8D3-46D9-A140-6DBA749C41A6}" type="datetimeFigureOut">
               <a:rPr lang="en-US" smtClean="0"/>
               <a:pPr/>
-              <a:t>12/9/2019</a:t>
+              <a:t>12/9/19</a:t>
             </a:fld>
             <a:endParaRPr lang="en-IN"/>
           </a:p>
@@ -3220,10 +3144,9 @@
           </a:lstStyle>
           <a:p>
             <a:r>
-              <a:rPr kumimoji="0" lang="en-US" smtClean="0"/>
+              <a:rPr kumimoji="0" lang="en-US"/>
               <a:t>Click to edit Master title style</a:t>
             </a:r>
-            <a:endParaRPr kumimoji="0" lang="en-US"/>
           </a:p>
         </p:txBody>
       </p:sp>
@@ -3303,9 +3226,7 @@
         </p:spPr>
         <p:txBody>
           <a:bodyPr vert="horz" wrap="square" lIns="127553" tIns="63777" rIns="127553" bIns="63777" anchor="t" compatLnSpc="1"/>
-          <a:lstStyle>
-            <a:extLst/>
-          </a:lstStyle>
+          <a:lstStyle/>
           <a:p>
             <a:endParaRPr kumimoji="0" lang="en-US"/>
           </a:p>
@@ -3385,9 +3306,7 @@
         </p:spPr>
         <p:txBody>
           <a:bodyPr vert="horz" wrap="square" lIns="127553" tIns="63777" rIns="127553" bIns="63777" anchor="t" compatLnSpc="1"/>
-          <a:lstStyle>
-            <a:extLst/>
-          </a:lstStyle>
+          <a:lstStyle/>
           <a:p>
             <a:endParaRPr kumimoji="0" lang="en-US"/>
           </a:p>
@@ -3495,9 +3414,7 @@
         </p:style>
         <p:txBody>
           <a:bodyPr vert="horz" wrap="square" lIns="127553" tIns="63777" rIns="127553" bIns="63777" anchor="ctr" compatLnSpc="1"/>
-          <a:lstStyle>
-            <a:extLst/>
-          </a:lstStyle>
+          <a:lstStyle/>
           <a:p>
             <a:pPr algn="ctr" eaLnBrk="1" latinLnBrk="0" hangingPunct="1"/>
             <a:endParaRPr kumimoji="0" lang="en-US"/>
@@ -3628,9 +3545,7 @@
         </p:style>
         <p:txBody>
           <a:bodyPr lIns="127553" tIns="63777" rIns="127553" bIns="63777" anchor="ctr"/>
-          <a:lstStyle>
-            <a:extLst/>
-          </a:lstStyle>
+          <a:lstStyle/>
           <a:p>
             <a:pPr algn="l" eaLnBrk="1" latinLnBrk="0" hangingPunct="1"/>
             <a:endParaRPr kumimoji="0" lang="en-US"/>
@@ -3708,9 +3623,7 @@
         </p:style>
         <p:txBody>
           <a:bodyPr lIns="127553" tIns="63777" rIns="127553" bIns="63777" anchor="ctr"/>
-          <a:lstStyle>
-            <a:extLst/>
-          </a:lstStyle>
+          <a:lstStyle/>
           <a:p>
             <a:pPr algn="l" eaLnBrk="1" latinLnBrk="0" hangingPunct="1"/>
             <a:endParaRPr kumimoji="0" lang="en-US"/>
@@ -3823,9 +3736,7 @@
         </p:spPr>
         <p:txBody>
           <a:bodyPr vert="horz" wrap="square" lIns="127553" tIns="63777" rIns="127553" bIns="63777" anchor="t" compatLnSpc="1"/>
-          <a:lstStyle>
-            <a:extLst/>
-          </a:lstStyle>
+          <a:lstStyle/>
           <a:p>
             <a:endParaRPr kumimoji="0" lang="en-US"/>
           </a:p>
@@ -3905,9 +3816,7 @@
         </p:spPr>
         <p:txBody>
           <a:bodyPr vert="horz" wrap="square" lIns="127553" tIns="63777" rIns="127553" bIns="63777" anchor="t" compatLnSpc="1"/>
-          <a:lstStyle>
-            <a:extLst/>
-          </a:lstStyle>
+          <a:lstStyle/>
           <a:p>
             <a:endParaRPr kumimoji="0" lang="en-US"/>
           </a:p>
@@ -4015,9 +3924,7 @@
         </p:style>
         <p:txBody>
           <a:bodyPr vert="horz" wrap="square" lIns="127553" tIns="63777" rIns="127553" bIns="63777" anchor="ctr" compatLnSpc="1"/>
-          <a:lstStyle>
-            <a:extLst/>
-          </a:lstStyle>
+          <a:lstStyle/>
           <a:p>
             <a:pPr algn="ctr" eaLnBrk="1" latinLnBrk="0" hangingPunct="1"/>
             <a:endParaRPr kumimoji="0" lang="en-US"/>
@@ -4107,15 +4014,12 @@
               <a:bevelT w="25400" h="25400"/>
             </a:sp3d>
           </a:bodyPr>
-          <a:lstStyle>
-            <a:extLst/>
-          </a:lstStyle>
-          <a:p>
-            <a:r>
-              <a:rPr kumimoji="0" lang="en-US" smtClean="0"/>
+          <a:lstStyle/>
+          <a:p>
+            <a:r>
+              <a:rPr kumimoji="0" lang="en-US"/>
               <a:t>Click to edit Master title style</a:t>
             </a:r>
-            <a:endParaRPr kumimoji="0" lang="en-US"/>
           </a:p>
         </p:txBody>
       </p:sp>
@@ -4142,44 +4046,41 @@
           <a:bodyPr vert="horz" lIns="127553" tIns="63777" rIns="127553" bIns="63777">
             <a:normAutofit/>
           </a:bodyPr>
-          <a:lstStyle>
-            <a:extLst/>
-          </a:lstStyle>
+          <a:lstStyle/>
           <a:p>
             <a:pPr lvl="0" eaLnBrk="1" latinLnBrk="0" hangingPunct="1"/>
             <a:r>
-              <a:rPr kumimoji="0" lang="en-US" smtClean="0"/>
+              <a:rPr kumimoji="0" lang="en-US"/>
               <a:t>Click to edit Master text styles</a:t>
             </a:r>
           </a:p>
           <a:p>
             <a:pPr lvl="1" eaLnBrk="1" latinLnBrk="0" hangingPunct="1"/>
             <a:r>
-              <a:rPr kumimoji="0" lang="en-US" smtClean="0"/>
+              <a:rPr kumimoji="0" lang="en-US"/>
               <a:t>Second level</a:t>
             </a:r>
           </a:p>
           <a:p>
             <a:pPr lvl="2" eaLnBrk="1" latinLnBrk="0" hangingPunct="1"/>
             <a:r>
-              <a:rPr kumimoji="0" lang="en-US" smtClean="0"/>
+              <a:rPr kumimoji="0" lang="en-US"/>
               <a:t>Third level</a:t>
             </a:r>
           </a:p>
           <a:p>
             <a:pPr lvl="3" eaLnBrk="1" latinLnBrk="0" hangingPunct="1"/>
             <a:r>
-              <a:rPr kumimoji="0" lang="en-US" smtClean="0"/>
+              <a:rPr kumimoji="0" lang="en-US"/>
               <a:t>Fourth level</a:t>
             </a:r>
           </a:p>
           <a:p>
             <a:pPr lvl="4" eaLnBrk="1" latinLnBrk="0" hangingPunct="1"/>
             <a:r>
-              <a:rPr kumimoji="0" lang="en-US" smtClean="0"/>
+              <a:rPr kumimoji="0" lang="en-US"/>
               <a:t>Fifth level</a:t>
             </a:r>
-            <a:endParaRPr kumimoji="0" lang="en-US"/>
           </a:p>
         </p:txBody>
       </p:sp>
@@ -4218,7 +4119,7 @@
             <a:fld id="{CB6B527C-F8D3-46D9-A140-6DBA749C41A6}" type="datetimeFigureOut">
               <a:rPr lang="en-US" smtClean="0"/>
               <a:pPr/>
-              <a:t>12/9/2019</a:t>
+              <a:t>12/9/19</a:t>
             </a:fld>
             <a:endParaRPr lang="en-IN"/>
           </a:p>
@@ -4649,38 +4550,22 @@
           <a:lstStyle/>
           <a:p>
             <a:pPr algn="ctr"/>
-            <a:r>
-              <a:rPr lang="en-IN" sz="5300" dirty="0" smtClean="0">
-                <a:solidFill>
-                  <a:schemeClr val="tx1"/>
-                </a:solidFill>
-              </a:rPr>
-              <a:t/>
-            </a:r>
             <a:br>
-              <a:rPr lang="en-IN" sz="5300" dirty="0" smtClean="0">
+              <a:rPr lang="en-IN" sz="5300" dirty="0">
                 <a:solidFill>
                   <a:schemeClr val="tx1"/>
                 </a:solidFill>
               </a:rPr>
             </a:br>
-            <a:r>
-              <a:rPr lang="en-IN" sz="5300" dirty="0" smtClean="0">
-                <a:solidFill>
-                  <a:schemeClr val="tx1"/>
-                </a:solidFill>
-              </a:rPr>
-              <a:t/>
-            </a:r>
             <a:br>
-              <a:rPr lang="en-IN" sz="5300" dirty="0" smtClean="0">
+              <a:rPr lang="en-IN" sz="5300" dirty="0">
                 <a:solidFill>
                   <a:schemeClr val="tx1"/>
                 </a:solidFill>
               </a:rPr>
             </a:br>
             <a:r>
-              <a:rPr lang="en-IN" sz="5300" dirty="0" smtClean="0">
+              <a:rPr lang="en-IN" sz="5300" dirty="0">
                 <a:solidFill>
                   <a:schemeClr val="tx1"/>
                 </a:solidFill>
@@ -4688,29 +4573,21 @@
               <a:t> </a:t>
             </a:r>
             <a:br>
-              <a:rPr lang="en-IN" sz="5300" dirty="0" smtClean="0">
+              <a:rPr lang="en-IN" sz="5300" dirty="0">
                 <a:solidFill>
                   <a:schemeClr val="tx1"/>
                 </a:solidFill>
               </a:rPr>
             </a:br>
-            <a:r>
-              <a:rPr lang="en-IN" sz="5300" dirty="0" smtClean="0">
-                <a:solidFill>
-                  <a:schemeClr val="tx1"/>
-                </a:solidFill>
-              </a:rPr>
-              <a:t/>
-            </a:r>
             <a:br>
-              <a:rPr lang="en-IN" sz="5300" dirty="0" smtClean="0">
+              <a:rPr lang="en-IN" sz="5300" dirty="0">
                 <a:solidFill>
                   <a:schemeClr val="tx1"/>
                 </a:solidFill>
               </a:rPr>
             </a:br>
             <a:r>
-              <a:rPr lang="en-IN" sz="4400" dirty="0" smtClean="0">
+              <a:rPr lang="en-IN" sz="4400" dirty="0">
                 <a:solidFill>
                   <a:schemeClr val="tx1"/>
                 </a:solidFill>
@@ -4718,17 +4595,8 @@
               </a:rPr>
               <a:t>MAPD112-Web Techs-Mobile Platforms</a:t>
             </a:r>
-            <a:r>
-              <a:rPr lang="en-IN" sz="5300" dirty="0" smtClean="0">
-                <a:solidFill>
-                  <a:schemeClr val="tx1"/>
-                </a:solidFill>
-                <a:effectLst/>
-              </a:rPr>
-              <a:t/>
-            </a:r>
             <a:br>
-              <a:rPr lang="en-IN" sz="5300" dirty="0" smtClean="0">
+              <a:rPr lang="en-IN" sz="5300" dirty="0">
                 <a:solidFill>
                   <a:schemeClr val="tx1"/>
                 </a:solidFill>
@@ -4736,7 +4604,7 @@
               </a:rPr>
             </a:br>
             <a:r>
-              <a:rPr lang="en-IN" sz="4400" dirty="0" smtClean="0">
+              <a:rPr lang="en-IN" sz="4400" dirty="0">
                 <a:solidFill>
                   <a:schemeClr val="tx1"/>
                 </a:solidFill>
@@ -4745,18 +4613,13 @@
               <a:t>Project Name : </a:t>
             </a:r>
             <a:r>
-              <a:rPr lang="en-IN" sz="4400" dirty="0" smtClean="0">
+              <a:rPr lang="en-IN" sz="4400" dirty="0">
                 <a:solidFill>
                   <a:schemeClr val="tx1"/>
                 </a:solidFill>
               </a:rPr>
               <a:t>HEALTH &amp; CARE</a:t>
             </a:r>
-            <a:endParaRPr lang="en-IN" sz="4400" dirty="0">
-              <a:solidFill>
-                <a:schemeClr val="tx1"/>
-              </a:solidFill>
-            </a:endParaRPr>
           </a:p>
         </p:txBody>
       </p:sp>
@@ -4784,7 +4647,7 @@
           <a:p>
             <a:pPr algn="l"/>
             <a:r>
-              <a:rPr lang="en-IN" sz="2700" dirty="0" smtClean="0">
+              <a:rPr lang="en-IN" sz="2700" dirty="0">
                 <a:solidFill>
                   <a:schemeClr val="tx1"/>
                 </a:solidFill>
@@ -4799,7 +4662,7 @@
               <a:buAutoNum type="arabicPeriod"/>
             </a:pPr>
             <a:r>
-              <a:rPr lang="en-IN" sz="2700" dirty="0" smtClean="0">
+              <a:rPr lang="en-IN" sz="2700" dirty="0">
                 <a:solidFill>
                   <a:schemeClr val="tx1"/>
                 </a:solidFill>
@@ -4814,26 +4677,13 @@
               <a:buAutoNum type="arabicPeriod"/>
             </a:pPr>
             <a:r>
-              <a:rPr lang="en-IN" sz="2700" dirty="0" smtClean="0">
+              <a:rPr lang="en-IN" sz="2700" dirty="0">
                 <a:solidFill>
                   <a:schemeClr val="tx1"/>
                 </a:solidFill>
               </a:rPr>
-              <a:t>Loveleen </a:t>
-            </a:r>
-            <a:r>
-              <a:rPr lang="en-IN" sz="2700" dirty="0" smtClean="0">
-                <a:solidFill>
-                  <a:schemeClr val="tx1"/>
-                </a:solidFill>
-              </a:rPr>
-              <a:t>Kaur(301093331)</a:t>
-            </a:r>
-            <a:endParaRPr lang="en-IN" sz="2700" dirty="0" smtClean="0">
-              <a:solidFill>
-                <a:schemeClr val="tx1"/>
-              </a:solidFill>
-            </a:endParaRPr>
+              <a:t>Loveleen Kaur(301093331)</a:t>
+            </a:r>
           </a:p>
           <a:p>
             <a:pPr marL="569437" indent="-569437" algn="l">
@@ -4842,26 +4692,13 @@
               <a:buAutoNum type="arabicPeriod"/>
             </a:pPr>
             <a:r>
-              <a:rPr lang="en-IN" sz="2700" dirty="0" smtClean="0">
+              <a:rPr lang="en-IN" sz="2700" dirty="0">
                 <a:solidFill>
                   <a:schemeClr val="tx1"/>
                 </a:solidFill>
               </a:rPr>
-              <a:t>Bhavya </a:t>
-            </a:r>
-            <a:r>
-              <a:rPr lang="en-IN" sz="2700" dirty="0" smtClean="0">
-                <a:solidFill>
-                  <a:schemeClr val="tx1"/>
-                </a:solidFill>
-              </a:rPr>
-              <a:t>Shah(301076681)</a:t>
-            </a:r>
-            <a:endParaRPr lang="en-IN" sz="2700" dirty="0" smtClean="0">
-              <a:solidFill>
-                <a:schemeClr val="tx1"/>
-              </a:solidFill>
-            </a:endParaRPr>
+              <a:t>Bhavya Shah(301076681)</a:t>
+            </a:r>
           </a:p>
           <a:p>
             <a:pPr marL="569437" indent="-569437" algn="l">
@@ -4870,19 +4707,19 @@
               <a:buAutoNum type="arabicPeriod"/>
             </a:pPr>
             <a:r>
-              <a:rPr lang="en-IN" sz="2700" dirty="0" smtClean="0">
+              <a:rPr lang="en-IN" sz="2700" dirty="0">
                 <a:solidFill>
                   <a:schemeClr val="tx1"/>
                 </a:solidFill>
               </a:rPr>
-              <a:t>Huen Oh()</a:t>
+              <a:t>Huen Oh(301082798)</a:t>
             </a:r>
           </a:p>
           <a:p>
             <a:pPr marL="506166" indent="-506166" algn="l">
               <a:buClrTx/>
             </a:pPr>
-            <a:endParaRPr lang="en-IN" sz="2700" dirty="0" smtClean="0">
+            <a:endParaRPr lang="en-IN" sz="2700" dirty="0">
               <a:solidFill>
                 <a:schemeClr val="tx1"/>
               </a:solidFill>
@@ -4893,28 +4730,12 @@
               <a:buClrTx/>
             </a:pPr>
             <a:r>
-              <a:rPr lang="en-IN" sz="2700" dirty="0" smtClean="0">
+              <a:rPr lang="en-IN" sz="2700" dirty="0">
                 <a:solidFill>
                   <a:schemeClr val="tx1"/>
                 </a:solidFill>
               </a:rPr>
-              <a:t>                                                                           </a:t>
-            </a:r>
-            <a:r>
-              <a:rPr lang="en-IN" sz="2700" dirty="0" smtClean="0">
-                <a:solidFill>
-                  <a:schemeClr val="tx1"/>
-                </a:solidFill>
-              </a:rPr>
-              <a:t>Under </a:t>
-            </a:r>
-            <a:r>
-              <a:rPr lang="en-IN" sz="2700" dirty="0" smtClean="0">
-                <a:solidFill>
-                  <a:schemeClr val="tx1"/>
-                </a:solidFill>
-              </a:rPr>
-              <a:t>the Guidance of</a:t>
+              <a:t>                                                                           Under the Guidance of</a:t>
             </a:r>
           </a:p>
           <a:p>
@@ -4922,27 +4743,19 @@
               <a:buClrTx/>
             </a:pPr>
             <a:r>
-              <a:rPr lang="en-IN" sz="3200" dirty="0" smtClean="0">
+              <a:rPr lang="en-IN" sz="3200" dirty="0">
                 <a:solidFill>
                   <a:schemeClr val="bg1"/>
                 </a:solidFill>
               </a:rPr>
-              <a:t>Przemyslaw </a:t>
-            </a:r>
-            <a:r>
-              <a:rPr lang="en-IN" sz="3200" dirty="0" smtClean="0">
-                <a:solidFill>
-                  <a:schemeClr val="bg1"/>
-                </a:solidFill>
-              </a:rPr>
-              <a:t>Pawluk</a:t>
+              <a:t>Przemyslaw Pawluk</a:t>
             </a:r>
           </a:p>
           <a:p>
             <a:pPr marL="506166" indent="-506166" algn="l">
               <a:buClrTx/>
             </a:pPr>
-            <a:endParaRPr lang="en-IN" sz="2700" dirty="0" smtClean="0">
+            <a:endParaRPr lang="en-IN" sz="2700" dirty="0">
               <a:solidFill>
                 <a:schemeClr val="tx1"/>
               </a:solidFill>
@@ -4952,7 +4765,7 @@
             <a:pPr marL="506166" indent="-506166" algn="l">
               <a:buClrTx/>
             </a:pPr>
-            <a:endParaRPr lang="en-IN" sz="2700" dirty="0" smtClean="0">
+            <a:endParaRPr lang="en-IN" sz="2700" dirty="0">
               <a:solidFill>
                 <a:schemeClr val="tx1"/>
               </a:solidFill>
@@ -4962,7 +4775,7 @@
             <a:pPr marL="506166" indent="-506166" algn="l">
               <a:buClrTx/>
             </a:pPr>
-            <a:endParaRPr lang="en-IN" sz="2700" dirty="0" smtClean="0">
+            <a:endParaRPr lang="en-IN" sz="2700" dirty="0">
               <a:solidFill>
                 <a:schemeClr val="tx1"/>
               </a:solidFill>
@@ -5021,11 +4834,11 @@
               <a:buNone/>
             </a:pPr>
             <a:r>
-              <a:rPr lang="en-IN" sz="3600" dirty="0" smtClean="0"/>
+              <a:rPr lang="en-IN" sz="3600" dirty="0"/>
               <a:t>Backend </a:t>
             </a:r>
             <a:r>
-              <a:rPr lang="en-IN" sz="3200" dirty="0" smtClean="0"/>
+              <a:rPr lang="en-IN" sz="3200" dirty="0"/>
               <a:t>   </a:t>
             </a:r>
           </a:p>
@@ -5035,10 +4848,9 @@
               <a:buChar char="•"/>
             </a:pPr>
             <a:r>
-              <a:rPr lang="en-IN" sz="2800" dirty="0" smtClean="0"/>
+              <a:rPr lang="en-IN" sz="2800" dirty="0"/>
               <a:t>RESTful : restify, JavaScript, Typescript</a:t>
             </a:r>
-            <a:endParaRPr lang="en-IN" sz="2800" dirty="0" smtClean="0"/>
           </a:p>
           <a:p>
             <a:pPr>
@@ -5046,12 +4858,8 @@
               <a:buChar char="•"/>
             </a:pPr>
             <a:r>
-              <a:rPr lang="en-IN" sz="2800" dirty="0" smtClean="0"/>
-              <a:t>DB : MongoDB Atlas cloud - </a:t>
-            </a:r>
-            <a:r>
-              <a:rPr lang="en-IN" sz="2800" dirty="0" smtClean="0"/>
-              <a:t>cloud.mongodb.com</a:t>
+              <a:rPr lang="en-IN" sz="2800" dirty="0"/>
+              <a:t>DB : MongoDB Atlas cloud - cloud.mongodb.com</a:t>
             </a:r>
           </a:p>
           <a:p>
@@ -5060,12 +4868,8 @@
               <a:buChar char="•"/>
             </a:pPr>
             <a:r>
-              <a:rPr lang="en-IN" sz="2800" dirty="0" smtClean="0"/>
-              <a:t>Deployment </a:t>
-            </a:r>
-            <a:r>
-              <a:rPr lang="en-IN" sz="2800" dirty="0" smtClean="0"/>
-              <a:t>: Heroku, Swagger </a:t>
+              <a:rPr lang="en-IN" sz="2800" dirty="0"/>
+              <a:t>Deployment : Heroku, Swagger </a:t>
             </a:r>
           </a:p>
           <a:p>
@@ -5074,12 +4878,8 @@
               <a:buChar char="•"/>
             </a:pPr>
             <a:r>
-              <a:rPr lang="en-IN" sz="2800" dirty="0" smtClean="0"/>
-              <a:t>Unit test : mocha, chai-http</a:t>
-            </a:r>
-            <a:r>
-              <a:rPr lang="en-IN" sz="2800" dirty="0" smtClean="0"/>
-              <a:t>  </a:t>
+              <a:rPr lang="en-IN" sz="2800" dirty="0"/>
+              <a:t>Unit test : mocha, chai-http  </a:t>
             </a:r>
           </a:p>
           <a:p>
@@ -5087,7 +4887,7 @@
               <a:buFont typeface="Arial" pitchFamily="34" charset="0"/>
               <a:buChar char="•"/>
             </a:pPr>
-            <a:endParaRPr lang="en-IN" sz="2400" dirty="0" smtClean="0"/>
+            <a:endParaRPr lang="en-IN" sz="2400" dirty="0"/>
           </a:p>
           <a:p>
             <a:pPr>
@@ -5120,10 +4920,9 @@
           <a:lstStyle/>
           <a:p>
             <a:r>
-              <a:rPr lang="en-IN" sz="5400" dirty="0" smtClean="0"/>
+              <a:rPr lang="en-IN" sz="5400" dirty="0"/>
               <a:t>Tools &amp; Technologies Used</a:t>
             </a:r>
-            <a:endParaRPr lang="en-IN" sz="5400" dirty="0"/>
           </a:p>
         </p:txBody>
       </p:sp>
@@ -5170,7 +4969,7 @@
             <a:pPr>
               <a:buNone/>
             </a:pPr>
-            <a:endParaRPr lang="en-CA" dirty="0" smtClean="0">
+            <a:endParaRPr lang="en-CA" dirty="0">
               <a:latin typeface="Helvetica Neue" panose="02000503000000020004" pitchFamily="2" charset="0"/>
             </a:endParaRPr>
           </a:p>
@@ -5180,7 +4979,7 @@
               <a:buAutoNum type="arabicPeriod"/>
             </a:pPr>
             <a:r>
-              <a:rPr lang="en-CA" dirty="0" smtClean="0">
+              <a:rPr lang="en-CA" dirty="0">
                 <a:latin typeface="Helvetica Neue" panose="02000503000000020004" pitchFamily="2" charset="0"/>
               </a:rPr>
               <a:t>Time constraint with multiple projects</a:t>
@@ -5192,7 +4991,7 @@
               <a:buAutoNum type="arabicPeriod"/>
             </a:pPr>
             <a:r>
-              <a:rPr lang="en-CA" dirty="0" smtClean="0">
+              <a:rPr lang="en-CA" dirty="0">
                 <a:latin typeface="Helvetica Neue" panose="02000503000000020004" pitchFamily="2" charset="0"/>
               </a:rPr>
               <a:t>New languages, New concepts</a:t>
@@ -5204,7 +5003,7 @@
               <a:buAutoNum type="arabicPeriod"/>
             </a:pPr>
             <a:r>
-              <a:rPr lang="en-CA" dirty="0" smtClean="0">
+              <a:rPr lang="en-CA" dirty="0">
                 <a:latin typeface="Helvetica Neue" panose="02000503000000020004" pitchFamily="2" charset="0"/>
               </a:rPr>
               <a:t>Mostly from backend : No connection, errors…</a:t>
@@ -5216,22 +5015,10 @@
               <a:buAutoNum type="arabicPeriod"/>
             </a:pPr>
             <a:r>
-              <a:rPr lang="en-CA" dirty="0" smtClean="0">
+              <a:rPr lang="en-CA" dirty="0">
                 <a:latin typeface="Helvetica Neue" panose="02000503000000020004" pitchFamily="2" charset="0"/>
               </a:rPr>
-              <a:t>To solve??? : </a:t>
-            </a:r>
-            <a:r>
-              <a:rPr lang="en-CA" dirty="0" smtClean="0">
-                <a:latin typeface="Helvetica Neue" panose="02000503000000020004" pitchFamily="2" charset="0"/>
-              </a:rPr>
-              <a:t>Google </a:t>
-            </a:r>
-            <a:r>
-              <a:rPr lang="en-CA" dirty="0" smtClean="0">
-                <a:latin typeface="Helvetica Neue" panose="02000503000000020004" pitchFamily="2" charset="0"/>
-              </a:rPr>
-              <a:t>search, experiments, apply</a:t>
+              <a:t>To solve??? : Google search, experiments, apply</a:t>
             </a:r>
           </a:p>
           <a:p>
@@ -5260,7 +5047,7 @@
           <a:lstStyle/>
           <a:p>
             <a:r>
-              <a:rPr lang="en-IN" sz="5400" dirty="0" err="1" smtClean="0"/>
+              <a:rPr lang="en-IN" sz="5400" dirty="0" err="1"/>
               <a:t>Challanges</a:t>
             </a:r>
             <a:endParaRPr lang="en-IN" sz="5400" dirty="0"/>
@@ -5315,10 +5102,9 @@
           <a:lstStyle/>
           <a:p>
             <a:r>
-              <a:rPr lang="en-IN" sz="5400" dirty="0" smtClean="0"/>
+              <a:rPr lang="en-IN" sz="5400" dirty="0"/>
               <a:t>Application Flow</a:t>
             </a:r>
-            <a:endParaRPr lang="en-IN" sz="5400" dirty="0"/>
           </a:p>
         </p:txBody>
       </p:sp>
@@ -5396,14 +5182,18 @@
           <a:lstStyle/>
           <a:p>
             <a:r>
-              <a:rPr lang="en-IN" dirty="0" smtClean="0"/>
+              <a:rPr lang="en-IN" dirty="0"/>
               <a:t>                Thank You!!!!</a:t>
             </a:r>
-            <a:endParaRPr lang="en-IN" dirty="0"/>
           </a:p>
         </p:txBody>
       </p:sp>
     </p:spTree>
+    <p:extLst>
+      <p:ext uri="{BB962C8B-B14F-4D97-AF65-F5344CB8AC3E}">
+        <p14:creationId xmlns:p14="http://schemas.microsoft.com/office/powerpoint/2010/main" val="1290413559"/>
+      </p:ext>
+    </p:extLst>
   </p:cSld>
   <p:clrMapOvr>
     <a:masterClrMapping/>
@@ -5449,16 +5239,15 @@
           <a:lstStyle/>
           <a:p>
             <a:r>
-              <a:rPr lang="en-IN" dirty="0" smtClean="0"/>
+              <a:rPr lang="en-IN" dirty="0"/>
               <a:t>We have developed a Patient Clinical Data Management Application for the health care providers.</a:t>
             </a:r>
           </a:p>
           <a:p>
             <a:r>
-              <a:rPr lang="en-IN" dirty="0" smtClean="0"/>
+              <a:rPr lang="en-IN" dirty="0"/>
               <a:t>It helps the health care providers to manage a group of patients and view the detailed clinical data for an individual patient. </a:t>
             </a:r>
-            <a:endParaRPr lang="en-IN" dirty="0"/>
           </a:p>
         </p:txBody>
       </p:sp>
@@ -5485,10 +5274,9 @@
           <a:lstStyle/>
           <a:p>
             <a:r>
-              <a:rPr lang="en-IN" sz="5400" dirty="0" smtClean="0"/>
+              <a:rPr lang="en-IN" sz="5400" dirty="0"/>
               <a:t>Introduction &amp; Scope</a:t>
             </a:r>
-            <a:endParaRPr lang="en-IN" sz="5400" dirty="0"/>
           </a:p>
         </p:txBody>
       </p:sp>
@@ -5540,10 +5328,9 @@
           <a:lstStyle/>
           <a:p>
             <a:r>
-              <a:rPr lang="en-IN" sz="5400" dirty="0" smtClean="0"/>
+              <a:rPr lang="en-IN" sz="5400" dirty="0"/>
               <a:t>Desktop View</a:t>
             </a:r>
-            <a:endParaRPr lang="en-IN" sz="5400" dirty="0"/>
           </a:p>
         </p:txBody>
       </p:sp>
@@ -5623,7 +5410,7 @@
               <a:defRPr/>
             </a:pPr>
             <a:r>
-              <a:rPr kumimoji="0" lang="en-IN" sz="3200" i="0" u="none" strike="noStrike" kern="1200" cap="none" spc="0" normalizeH="0" baseline="0" noProof="0" dirty="0" smtClean="0">
+              <a:rPr kumimoji="0" lang="en-IN" sz="3200" i="0" u="none" strike="noStrike" kern="1200" cap="none" spc="0" normalizeH="0" baseline="0" noProof="0" dirty="0">
                 <a:ln>
                   <a:noFill/>
                 </a:ln>
@@ -5637,18 +5424,6 @@
               </a:rPr>
               <a:t>Login Page</a:t>
             </a:r>
-            <a:endParaRPr kumimoji="0" lang="en-IN" sz="3200" i="0" u="none" strike="noStrike" kern="1200" cap="none" spc="0" normalizeH="0" baseline="0" noProof="0" dirty="0">
-              <a:ln>
-                <a:noFill/>
-              </a:ln>
-              <a:solidFill>
-                <a:schemeClr val="tx2"/>
-              </a:solidFill>
-              <a:uLnTx/>
-              <a:uFillTx/>
-              <a:ea typeface="+mj-ea"/>
-              <a:cs typeface="+mj-cs"/>
-            </a:endParaRPr>
           </a:p>
         </p:txBody>
       </p:sp>
@@ -5700,10 +5475,9 @@
           <a:lstStyle/>
           <a:p>
             <a:r>
-              <a:rPr lang="en-IN" sz="5400" dirty="0" smtClean="0"/>
+              <a:rPr lang="en-IN" sz="5400" dirty="0"/>
               <a:t>Desktop View</a:t>
             </a:r>
-            <a:endParaRPr lang="en-IN" sz="5400" dirty="0"/>
           </a:p>
         </p:txBody>
       </p:sp>
@@ -5783,7 +5557,7 @@
               <a:defRPr/>
             </a:pPr>
             <a:r>
-              <a:rPr kumimoji="0" lang="en-IN" sz="3200" i="0" u="none" strike="noStrike" kern="1200" cap="none" spc="0" normalizeH="0" baseline="0" noProof="0" dirty="0" smtClean="0">
+              <a:rPr kumimoji="0" lang="en-IN" sz="3200" i="0" u="none" strike="noStrike" kern="1200" cap="none" spc="0" normalizeH="0" baseline="0" noProof="0" dirty="0">
                 <a:ln>
                   <a:noFill/>
                 </a:ln>
@@ -5797,18 +5571,6 @@
               </a:rPr>
               <a:t>View Patient  Page</a:t>
             </a:r>
-            <a:endParaRPr kumimoji="0" lang="en-IN" sz="3200" i="0" u="none" strike="noStrike" kern="1200" cap="none" spc="0" normalizeH="0" baseline="0" noProof="0" dirty="0">
-              <a:ln>
-                <a:noFill/>
-              </a:ln>
-              <a:solidFill>
-                <a:schemeClr val="tx2"/>
-              </a:solidFill>
-              <a:uLnTx/>
-              <a:uFillTx/>
-              <a:ea typeface="+mj-ea"/>
-              <a:cs typeface="+mj-cs"/>
-            </a:endParaRPr>
           </a:p>
         </p:txBody>
       </p:sp>
@@ -5860,10 +5622,9 @@
           <a:lstStyle/>
           <a:p>
             <a:r>
-              <a:rPr lang="en-IN" sz="5400" dirty="0" smtClean="0"/>
+              <a:rPr lang="en-IN" sz="5400" dirty="0"/>
               <a:t>Desktop View</a:t>
             </a:r>
-            <a:endParaRPr lang="en-IN" sz="5400" dirty="0"/>
           </a:p>
         </p:txBody>
       </p:sp>
@@ -5950,7 +5711,7 @@
               <a:defRPr/>
             </a:pPr>
             <a:r>
-              <a:rPr kumimoji="0" lang="en-IN" sz="3200" i="0" u="none" strike="noStrike" kern="1200" cap="none" spc="0" normalizeH="0" baseline="0" noProof="0" dirty="0" err="1" smtClean="0">
+              <a:rPr kumimoji="0" lang="en-IN" sz="3200" i="0" u="none" strike="noStrike" kern="1200" cap="none" spc="0" normalizeH="0" baseline="0" noProof="0" dirty="0" err="1">
                 <a:ln>
                   <a:noFill/>
                 </a:ln>
@@ -5965,7 +5726,7 @@
               <a:t>SearchPatient</a:t>
             </a:r>
             <a:r>
-              <a:rPr kumimoji="0" lang="en-IN" sz="3200" i="0" u="none" strike="noStrike" kern="1200" cap="none" spc="0" normalizeH="0" baseline="0" noProof="0" dirty="0" smtClean="0">
+              <a:rPr kumimoji="0" lang="en-IN" sz="3200" i="0" u="none" strike="noStrike" kern="1200" cap="none" spc="0" normalizeH="0" baseline="0" noProof="0" dirty="0">
                 <a:ln>
                   <a:noFill/>
                 </a:ln>
@@ -5979,18 +5740,6 @@
               </a:rPr>
               <a:t>  Page</a:t>
             </a:r>
-            <a:endParaRPr kumimoji="0" lang="en-IN" sz="3200" i="0" u="none" strike="noStrike" kern="1200" cap="none" spc="0" normalizeH="0" baseline="0" noProof="0" dirty="0">
-              <a:ln>
-                <a:noFill/>
-              </a:ln>
-              <a:solidFill>
-                <a:schemeClr val="tx2"/>
-              </a:solidFill>
-              <a:uLnTx/>
-              <a:uFillTx/>
-              <a:ea typeface="+mj-ea"/>
-              <a:cs typeface="+mj-cs"/>
-            </a:endParaRPr>
           </a:p>
         </p:txBody>
       </p:sp>
@@ -6040,10 +5789,9 @@
           <a:lstStyle/>
           <a:p>
             <a:r>
-              <a:rPr lang="en-IN" dirty="0" smtClean="0"/>
+              <a:rPr lang="en-IN" dirty="0"/>
               <a:t>Desktop View</a:t>
             </a:r>
-            <a:endParaRPr lang="en-IN" dirty="0"/>
           </a:p>
         </p:txBody>
       </p:sp>
@@ -6130,7 +5878,7 @@
               <a:defRPr/>
             </a:pPr>
             <a:r>
-              <a:rPr kumimoji="0" lang="en-IN" sz="3200" i="0" u="none" strike="noStrike" kern="1200" cap="none" spc="0" normalizeH="0" baseline="0" noProof="0" dirty="0" smtClean="0">
+              <a:rPr kumimoji="0" lang="en-IN" sz="3200" i="0" u="none" strike="noStrike" kern="1200" cap="none" spc="0" normalizeH="0" baseline="0" noProof="0" dirty="0">
                 <a:ln>
                   <a:noFill/>
                 </a:ln>
@@ -6144,18 +5892,6 @@
               </a:rPr>
               <a:t>Add Patient  Page</a:t>
             </a:r>
-            <a:endParaRPr kumimoji="0" lang="en-IN" sz="3200" i="0" u="none" strike="noStrike" kern="1200" cap="none" spc="0" normalizeH="0" baseline="0" noProof="0" dirty="0">
-              <a:ln>
-                <a:noFill/>
-              </a:ln>
-              <a:solidFill>
-                <a:schemeClr val="tx2"/>
-              </a:solidFill>
-              <a:uLnTx/>
-              <a:uFillTx/>
-              <a:ea typeface="+mj-ea"/>
-              <a:cs typeface="+mj-cs"/>
-            </a:endParaRPr>
           </a:p>
         </p:txBody>
       </p:sp>
@@ -6207,10 +5943,9 @@
           <a:lstStyle/>
           <a:p>
             <a:r>
-              <a:rPr lang="en-IN" dirty="0" smtClean="0"/>
+              <a:rPr lang="en-IN" dirty="0"/>
               <a:t>Desktop View</a:t>
             </a:r>
-            <a:endParaRPr lang="en-IN" dirty="0"/>
           </a:p>
         </p:txBody>
       </p:sp>
@@ -6297,7 +6032,7 @@
               <a:defRPr/>
             </a:pPr>
             <a:r>
-              <a:rPr kumimoji="0" lang="en-IN" sz="3200" i="0" u="none" strike="noStrike" kern="1200" cap="none" spc="0" normalizeH="0" baseline="0" noProof="0" dirty="0" smtClean="0">
+              <a:rPr kumimoji="0" lang="en-IN" sz="3200" i="0" u="none" strike="noStrike" kern="1200" cap="none" spc="0" normalizeH="0" baseline="0" noProof="0" dirty="0">
                 <a:ln>
                   <a:noFill/>
                 </a:ln>
@@ -6311,18 +6046,6 @@
               </a:rPr>
               <a:t>View Patient’s Record  Page</a:t>
             </a:r>
-            <a:endParaRPr kumimoji="0" lang="en-IN" sz="3200" i="0" u="none" strike="noStrike" kern="1200" cap="none" spc="0" normalizeH="0" baseline="0" noProof="0" dirty="0">
-              <a:ln>
-                <a:noFill/>
-              </a:ln>
-              <a:solidFill>
-                <a:schemeClr val="tx2"/>
-              </a:solidFill>
-              <a:uLnTx/>
-              <a:uFillTx/>
-              <a:ea typeface="+mj-ea"/>
-              <a:cs typeface="+mj-cs"/>
-            </a:endParaRPr>
           </a:p>
         </p:txBody>
       </p:sp>
@@ -6374,10 +6097,9 @@
           <a:lstStyle/>
           <a:p>
             <a:r>
-              <a:rPr lang="en-IN" sz="5400" dirty="0" smtClean="0"/>
+              <a:rPr lang="en-IN" sz="5400" dirty="0"/>
               <a:t>Mobile View </a:t>
             </a:r>
-            <a:endParaRPr lang="en-IN" sz="5400" dirty="0"/>
           </a:p>
         </p:txBody>
       </p:sp>
@@ -6458,11 +6180,11 @@
               <a:buNone/>
             </a:pPr>
             <a:r>
-              <a:rPr lang="en-IN" sz="3600" dirty="0" smtClean="0"/>
+              <a:rPr lang="en-IN" sz="3600" dirty="0"/>
               <a:t>Frontend </a:t>
             </a:r>
             <a:r>
-              <a:rPr lang="en-IN" sz="3200" dirty="0" smtClean="0"/>
+              <a:rPr lang="en-IN" sz="3200" dirty="0"/>
               <a:t>   </a:t>
             </a:r>
           </a:p>
@@ -6472,12 +6194,8 @@
               <a:buChar char="•"/>
             </a:pPr>
             <a:r>
-              <a:rPr lang="en-IN" sz="2800" dirty="0" smtClean="0"/>
-              <a:t>Responsive Design : Bootstrap, </a:t>
-            </a:r>
-            <a:r>
-              <a:rPr lang="en-IN" sz="2800" dirty="0" smtClean="0"/>
-              <a:t>JavaScript</a:t>
+              <a:rPr lang="en-IN" sz="2800" dirty="0"/>
+              <a:t>Responsive Design : Bootstrap, JavaScript</a:t>
             </a:r>
           </a:p>
           <a:p>
@@ -6486,7 +6204,7 @@
               <a:buChar char="•"/>
             </a:pPr>
             <a:r>
-              <a:rPr lang="en-IN" sz="2800" dirty="0" smtClean="0"/>
+              <a:rPr lang="en-IN" sz="2800" dirty="0"/>
               <a:t>Client-Server request : AJAX   </a:t>
             </a:r>
           </a:p>
@@ -6496,7 +6214,7 @@
               <a:buChar char="•"/>
             </a:pPr>
             <a:r>
-              <a:rPr lang="en-IN" sz="2800" dirty="0" smtClean="0"/>
+              <a:rPr lang="en-IN" sz="2800" dirty="0"/>
               <a:t>Authentication : JWT(JSON Web Token)    </a:t>
             </a:r>
           </a:p>
@@ -6506,7 +6224,7 @@
               <a:buChar char="•"/>
             </a:pPr>
             <a:r>
-              <a:rPr lang="en-IN" sz="2800" dirty="0" smtClean="0"/>
+              <a:rPr lang="en-IN" sz="2800" dirty="0"/>
               <a:t>Deployment : GitHub</a:t>
             </a:r>
           </a:p>
@@ -6515,7 +6233,7 @@
               <a:buNone/>
             </a:pPr>
             <a:r>
-              <a:rPr lang="en-IN" sz="2800" dirty="0" smtClean="0"/>
+              <a:rPr lang="en-IN" sz="2800" dirty="0"/>
               <a:t>  </a:t>
             </a:r>
           </a:p>
@@ -6524,7 +6242,7 @@
               <a:buFont typeface="Arial" pitchFamily="34" charset="0"/>
               <a:buChar char="•"/>
             </a:pPr>
-            <a:endParaRPr lang="en-IN" sz="2400" dirty="0" smtClean="0"/>
+            <a:endParaRPr lang="en-IN" sz="2400" dirty="0"/>
           </a:p>
           <a:p>
             <a:pPr>
@@ -6557,10 +6275,9 @@
           <a:lstStyle/>
           <a:p>
             <a:r>
-              <a:rPr lang="en-IN" sz="5400" dirty="0" smtClean="0"/>
+              <a:rPr lang="en-IN" sz="5400" dirty="0"/>
               <a:t>Tools &amp; Technologies Used</a:t>
             </a:r>
-            <a:endParaRPr lang="en-IN" sz="5400" dirty="0"/>
           </a:p>
         </p:txBody>
       </p:sp>

</xml_diff>

<commit_message>
update : page sequence
</commit_message>
<xml_diff>
--- a/doc/HEALTH_N_CARE.pptx
+++ b/doc/HEALTH_N_CARE.pptx
@@ -7,16 +7,16 @@
   <p:sldIdLst>
     <p:sldId id="256" r:id="rId2"/>
     <p:sldId id="257" r:id="rId3"/>
-    <p:sldId id="260" r:id="rId4"/>
-    <p:sldId id="259" r:id="rId5"/>
-    <p:sldId id="263" r:id="rId6"/>
-    <p:sldId id="264" r:id="rId7"/>
-    <p:sldId id="265" r:id="rId8"/>
-    <p:sldId id="261" r:id="rId9"/>
-    <p:sldId id="258" r:id="rId10"/>
-    <p:sldId id="266" r:id="rId11"/>
-    <p:sldId id="267" r:id="rId12"/>
-    <p:sldId id="268" r:id="rId13"/>
+    <p:sldId id="268" r:id="rId4"/>
+    <p:sldId id="260" r:id="rId5"/>
+    <p:sldId id="259" r:id="rId6"/>
+    <p:sldId id="263" r:id="rId7"/>
+    <p:sldId id="264" r:id="rId8"/>
+    <p:sldId id="265" r:id="rId9"/>
+    <p:sldId id="261" r:id="rId10"/>
+    <p:sldId id="258" r:id="rId11"/>
+    <p:sldId id="266" r:id="rId12"/>
+    <p:sldId id="267" r:id="rId13"/>
     <p:sldId id="271" r:id="rId14"/>
   </p:sldIdLst>
   <p:sldSz cx="14401800" cy="7921625"/>
@@ -4835,7 +4835,7 @@
             </a:pPr>
             <a:r>
               <a:rPr lang="en-IN" sz="3600" dirty="0"/>
-              <a:t>Backend </a:t>
+              <a:t>Frontend </a:t>
             </a:r>
             <a:r>
               <a:rPr lang="en-IN" sz="3200" dirty="0"/>
@@ -4849,7 +4849,7 @@
             </a:pPr>
             <a:r>
               <a:rPr lang="en-IN" sz="2800" dirty="0"/>
-              <a:t>RESTful : restify, JavaScript, Typescript</a:t>
+              <a:t>Responsive Design : Bootstrap, JavaScript</a:t>
             </a:r>
           </a:p>
           <a:p>
@@ -4859,7 +4859,7 @@
             </a:pPr>
             <a:r>
               <a:rPr lang="en-IN" sz="2800" dirty="0"/>
-              <a:t>DB : MongoDB Atlas cloud - cloud.mongodb.com</a:t>
+              <a:t>Client-Server request : AJAX   </a:t>
             </a:r>
           </a:p>
           <a:p>
@@ -4869,7 +4869,7 @@
             </a:pPr>
             <a:r>
               <a:rPr lang="en-IN" sz="2800" dirty="0"/>
-              <a:t>Deployment : Heroku, Swagger </a:t>
+              <a:t>Authentication : JWT(JSON Web Token)    </a:t>
             </a:r>
           </a:p>
           <a:p>
@@ -4879,7 +4879,16 @@
             </a:pPr>
             <a:r>
               <a:rPr lang="en-IN" sz="2800" dirty="0"/>
-              <a:t>Unit test : mocha, chai-http  </a:t>
+              <a:t>Deployment : GitHub</a:t>
+            </a:r>
+          </a:p>
+          <a:p>
+            <a:pPr>
+              <a:buNone/>
+            </a:pPr>
+            <a:r>
+              <a:rPr lang="en-IN" sz="2800" dirty="0"/>
+              <a:t>  </a:t>
             </a:r>
           </a:p>
           <a:p>
@@ -4961,71 +4970,82 @@
             <p:ph idx="1"/>
           </p:nvPr>
         </p:nvSpPr>
-        <p:spPr/>
-        <p:txBody>
-          <a:bodyPr/>
-          <a:lstStyle/>
+        <p:spPr>
+          <a:xfrm>
+            <a:off x="720090" y="1674797"/>
+            <a:ext cx="12961621" cy="4000528"/>
+          </a:xfrm>
+        </p:spPr>
+        <p:txBody>
+          <a:bodyPr>
+            <a:normAutofit/>
+          </a:bodyPr>
+          <a:lstStyle/>
+          <a:p>
+            <a:pPr marL="667416" indent="-514350">
+              <a:buNone/>
+            </a:pPr>
+            <a:r>
+              <a:rPr lang="en-IN" sz="3600" dirty="0"/>
+              <a:t>Backend </a:t>
+            </a:r>
+            <a:r>
+              <a:rPr lang="en-IN" sz="3200" dirty="0"/>
+              <a:t>   </a:t>
+            </a:r>
+          </a:p>
+          <a:p>
+            <a:pPr>
+              <a:buFont typeface="Arial" pitchFamily="34" charset="0"/>
+              <a:buChar char="•"/>
+            </a:pPr>
+            <a:r>
+              <a:rPr lang="en-IN" sz="2800" dirty="0"/>
+              <a:t>RESTful : restify, JavaScript, Typescript</a:t>
+            </a:r>
+          </a:p>
+          <a:p>
+            <a:pPr>
+              <a:buFont typeface="Arial" pitchFamily="34" charset="0"/>
+              <a:buChar char="•"/>
+            </a:pPr>
+            <a:r>
+              <a:rPr lang="en-IN" sz="2800" dirty="0"/>
+              <a:t>DB : MongoDB Atlas cloud - cloud.mongodb.com</a:t>
+            </a:r>
+          </a:p>
+          <a:p>
+            <a:pPr>
+              <a:buFont typeface="Arial" pitchFamily="34" charset="0"/>
+              <a:buChar char="•"/>
+            </a:pPr>
+            <a:r>
+              <a:rPr lang="en-IN" sz="2800" dirty="0"/>
+              <a:t>Deployment : Heroku, Swagger </a:t>
+            </a:r>
+          </a:p>
+          <a:p>
+            <a:pPr>
+              <a:buFont typeface="Arial" pitchFamily="34" charset="0"/>
+              <a:buChar char="•"/>
+            </a:pPr>
+            <a:r>
+              <a:rPr lang="en-IN" sz="2800" dirty="0"/>
+              <a:t>Unit test : mocha, chai-http  </a:t>
+            </a:r>
+          </a:p>
+          <a:p>
+            <a:pPr>
+              <a:buFont typeface="Arial" pitchFamily="34" charset="0"/>
+              <a:buChar char="•"/>
+            </a:pPr>
+            <a:endParaRPr lang="en-IN" sz="2400" dirty="0"/>
+          </a:p>
           <a:p>
             <a:pPr>
               <a:buNone/>
             </a:pPr>
-            <a:endParaRPr lang="en-CA" dirty="0">
-              <a:latin typeface="Helvetica Neue" panose="02000503000000020004" pitchFamily="2" charset="0"/>
-            </a:endParaRPr>
-          </a:p>
-          <a:p>
-            <a:pPr>
-              <a:buFont typeface="+mj-lt"/>
-              <a:buAutoNum type="arabicPeriod"/>
-            </a:pPr>
-            <a:r>
-              <a:rPr lang="en-CA" dirty="0">
-                <a:latin typeface="Helvetica Neue" panose="02000503000000020004" pitchFamily="2" charset="0"/>
-              </a:rPr>
-              <a:t>Time constraint with multiple projects</a:t>
-            </a:r>
-          </a:p>
-          <a:p>
-            <a:pPr>
-              <a:buFont typeface="+mj-lt"/>
-              <a:buAutoNum type="arabicPeriod"/>
-            </a:pPr>
-            <a:r>
-              <a:rPr lang="en-CA" dirty="0">
-                <a:latin typeface="Helvetica Neue" panose="02000503000000020004" pitchFamily="2" charset="0"/>
-              </a:rPr>
-              <a:t>New languages, New concepts</a:t>
-            </a:r>
-          </a:p>
-          <a:p>
-            <a:pPr>
-              <a:buFont typeface="+mj-lt"/>
-              <a:buAutoNum type="arabicPeriod"/>
-            </a:pPr>
-            <a:r>
-              <a:rPr lang="en-CA" dirty="0">
-                <a:latin typeface="Helvetica Neue" panose="02000503000000020004" pitchFamily="2" charset="0"/>
-              </a:rPr>
-              <a:t>Mostly from backend : No connection, errors…</a:t>
-            </a:r>
-          </a:p>
-          <a:p>
-            <a:pPr>
-              <a:buFont typeface="+mj-lt"/>
-              <a:buAutoNum type="arabicPeriod"/>
-            </a:pPr>
-            <a:r>
-              <a:rPr lang="en-CA" dirty="0">
-                <a:latin typeface="Helvetica Neue" panose="02000503000000020004" pitchFamily="2" charset="0"/>
-              </a:rPr>
-              <a:t>To solve??? : Google search, experiments, apply</a:t>
-            </a:r>
-          </a:p>
-          <a:p>
-            <a:pPr>
-              <a:buNone/>
-            </a:pPr>
-            <a:endParaRPr lang="en-IN" dirty="0"/>
+            <a:endParaRPr lang="en-IN" sz="2400" dirty="0"/>
           </a:p>
         </p:txBody>
       </p:sp>
@@ -5039,7 +5059,12 @@
             <p:ph type="title"/>
           </p:nvPr>
         </p:nvSpPr>
-        <p:spPr/>
+        <p:spPr>
+          <a:xfrm>
+            <a:off x="720090" y="317233"/>
+            <a:ext cx="12961621" cy="1143249"/>
+          </a:xfrm>
+        </p:spPr>
         <p:txBody>
           <a:bodyPr>
             <a:normAutofit/>
@@ -5047,10 +5072,9 @@
           <a:lstStyle/>
           <a:p>
             <a:r>
-              <a:rPr lang="en-IN" sz="5400" dirty="0" err="1"/>
-              <a:t>Challanges</a:t>
-            </a:r>
-            <a:endParaRPr lang="en-IN" sz="5400" dirty="0"/>
+              <a:rPr lang="en-IN" sz="5400" dirty="0"/>
+              <a:t>Tools &amp; Technologies Used</a:t>
+            </a:r>
           </a:p>
         </p:txBody>
       </p:sp>
@@ -5081,6 +5105,84 @@
       </p:grpSpPr>
       <p:sp>
         <p:nvSpPr>
+          <p:cNvPr id="2" name="Content Placeholder 1"/>
+          <p:cNvSpPr>
+            <a:spLocks noGrp="1"/>
+          </p:cNvSpPr>
+          <p:nvPr>
+            <p:ph idx="1"/>
+          </p:nvPr>
+        </p:nvSpPr>
+        <p:spPr/>
+        <p:txBody>
+          <a:bodyPr/>
+          <a:lstStyle/>
+          <a:p>
+            <a:pPr>
+              <a:buNone/>
+            </a:pPr>
+            <a:endParaRPr lang="en-CA" dirty="0">
+              <a:latin typeface="Helvetica Neue" panose="02000503000000020004" pitchFamily="2" charset="0"/>
+            </a:endParaRPr>
+          </a:p>
+          <a:p>
+            <a:pPr>
+              <a:buFont typeface="+mj-lt"/>
+              <a:buAutoNum type="arabicPeriod"/>
+            </a:pPr>
+            <a:r>
+              <a:rPr lang="en-CA" dirty="0">
+                <a:latin typeface="Helvetica Neue" panose="02000503000000020004" pitchFamily="2" charset="0"/>
+              </a:rPr>
+              <a:t>Time constraint with multiple projects</a:t>
+            </a:r>
+          </a:p>
+          <a:p>
+            <a:pPr>
+              <a:buFont typeface="+mj-lt"/>
+              <a:buAutoNum type="arabicPeriod"/>
+            </a:pPr>
+            <a:r>
+              <a:rPr lang="en-CA" dirty="0">
+                <a:latin typeface="Helvetica Neue" panose="02000503000000020004" pitchFamily="2" charset="0"/>
+              </a:rPr>
+              <a:t>New languages, New concepts</a:t>
+            </a:r>
+          </a:p>
+          <a:p>
+            <a:pPr>
+              <a:buFont typeface="+mj-lt"/>
+              <a:buAutoNum type="arabicPeriod"/>
+            </a:pPr>
+            <a:r>
+              <a:rPr lang="en-CA" dirty="0">
+                <a:latin typeface="Helvetica Neue" panose="02000503000000020004" pitchFamily="2" charset="0"/>
+              </a:rPr>
+              <a:t>Mostly from backend : No connection, errors…</a:t>
+            </a:r>
+          </a:p>
+          <a:p>
+            <a:pPr>
+              <a:buFont typeface="+mj-lt"/>
+              <a:buAutoNum type="arabicPeriod"/>
+            </a:pPr>
+            <a:r>
+              <a:rPr lang="en-CA" dirty="0">
+                <a:latin typeface="Helvetica Neue" panose="02000503000000020004" pitchFamily="2" charset="0"/>
+              </a:rPr>
+              <a:t>To solve??? : Google search, experiments, apply</a:t>
+            </a:r>
+          </a:p>
+          <a:p>
+            <a:pPr>
+              <a:buNone/>
+            </a:pPr>
+            <a:endParaRPr lang="en-IN" dirty="0"/>
+          </a:p>
+        </p:txBody>
+      </p:sp>
+      <p:sp>
+        <p:nvSpPr>
           <p:cNvPr id="3" name="Title 2"/>
           <p:cNvSpPr>
             <a:spLocks noGrp="1"/>
@@ -5089,12 +5191,7 @@
             <p:ph type="title"/>
           </p:nvPr>
         </p:nvSpPr>
-        <p:spPr>
-          <a:xfrm>
-            <a:off x="720090" y="317233"/>
-            <a:ext cx="12961621" cy="1143249"/>
-          </a:xfrm>
-        </p:spPr>
+        <p:spPr/>
         <p:txBody>
           <a:bodyPr>
             <a:normAutofit/>
@@ -5102,40 +5199,13 @@
           <a:lstStyle/>
           <a:p>
             <a:r>
-              <a:rPr lang="en-IN" sz="5400" dirty="0"/>
-              <a:t>Application Flow</a:t>
-            </a:r>
-          </a:p>
-        </p:txBody>
-      </p:sp>
-      <p:pic>
-        <p:nvPicPr>
-          <p:cNvPr id="7170" name="Picture 2" descr="C:\Users\hp\Downloads\WhatsApp Image 2019-12-06 at 9.39.16 AM.jpeg"/>
-          <p:cNvPicPr>
-            <a:picLocks noGrp="1" noChangeAspect="1" noChangeArrowheads="1"/>
-          </p:cNvPicPr>
-          <p:nvPr>
-            <p:ph idx="1"/>
-          </p:nvPr>
-        </p:nvPicPr>
-        <p:blipFill>
-          <a:blip r:embed="rId2"/>
-          <a:srcRect/>
-          <a:stretch>
-            <a:fillRect/>
-          </a:stretch>
-        </p:blipFill>
-        <p:spPr bwMode="auto">
-          <a:xfrm>
-            <a:off x="720725" y="1921365"/>
-            <a:ext cx="12960350" cy="4111149"/>
-          </a:xfrm>
-          <a:prstGeom prst="rect">
-            <a:avLst/>
-          </a:prstGeom>
-          <a:noFill/>
-        </p:spPr>
-      </p:pic>
+              <a:rPr lang="en-IN" sz="5400" dirty="0" err="1"/>
+              <a:t>Challanges</a:t>
+            </a:r>
+            <a:endParaRPr lang="en-IN" sz="5400" dirty="0"/>
+          </a:p>
+        </p:txBody>
+      </p:sp>
     </p:spTree>
   </p:cSld>
   <p:clrMapOvr>
@@ -5318,7 +5388,7 @@
         <p:spPr>
           <a:xfrm>
             <a:off x="720090" y="317233"/>
-            <a:ext cx="12961621" cy="1024087"/>
+            <a:ext cx="12961621" cy="1143249"/>
           </a:xfrm>
         </p:spPr>
         <p:txBody>
@@ -5329,14 +5399,14 @@
           <a:p>
             <a:r>
               <a:rPr lang="en-IN" sz="5400" dirty="0"/>
-              <a:t>Desktop View</a:t>
+              <a:t>Application Flow</a:t>
             </a:r>
           </a:p>
         </p:txBody>
       </p:sp>
       <p:pic>
         <p:nvPicPr>
-          <p:cNvPr id="2050" name="Picture 2" descr="C:\Users\hp\Desktop\home1.PNG"/>
+          <p:cNvPr id="7170" name="Picture 2" descr="C:\Users\hp\Downloads\WhatsApp Image 2019-12-06 at 9.39.16 AM.jpeg"/>
           <p:cNvPicPr>
             <a:picLocks noGrp="1" noChangeAspect="1" noChangeArrowheads="1"/>
           </p:cNvPicPr>
@@ -5353,8 +5423,8 @@
         </p:blipFill>
         <p:spPr bwMode="auto">
           <a:xfrm>
-            <a:off x="4700570" y="1370977"/>
-            <a:ext cx="9358378" cy="5804545"/>
+            <a:off x="720725" y="1921365"/>
+            <a:ext cx="12960350" cy="4111149"/>
           </a:xfrm>
           <a:prstGeom prst="rect">
             <a:avLst/>
@@ -5362,71 +5432,6 @@
           <a:noFill/>
         </p:spPr>
       </p:pic>
-      <p:sp>
-        <p:nvSpPr>
-          <p:cNvPr id="5" name="Title 2"/>
-          <p:cNvSpPr txBox="1">
-            <a:spLocks/>
-          </p:cNvSpPr>
-          <p:nvPr/>
-        </p:nvSpPr>
-        <p:spPr>
-          <a:xfrm>
-            <a:off x="557166" y="5461010"/>
-            <a:ext cx="3643338" cy="1071570"/>
-          </a:xfrm>
-          <a:prstGeom prst="rect">
-            <a:avLst/>
-          </a:prstGeom>
-        </p:spPr>
-        <p:txBody>
-          <a:bodyPr vert="horz" lIns="127553" tIns="63777" rIns="127553" bIns="63777" rtlCol="0" anchor="ctr">
-            <a:normAutofit/>
-            <a:scene3d>
-              <a:camera prst="orthographicFront"/>
-              <a:lightRig rig="soft" dir="t"/>
-            </a:scene3d>
-            <a:sp3d prstMaterial="softEdge">
-              <a:bevelT w="25400" h="25400"/>
-            </a:sp3d>
-          </a:bodyPr>
-          <a:lstStyle/>
-          <a:p>
-            <a:pPr marL="0" marR="0" lvl="0" indent="0" algn="l" defTabSz="914400" rtl="0" eaLnBrk="1" fontAlgn="auto" latinLnBrk="0" hangingPunct="1">
-              <a:lnSpc>
-                <a:spcPct val="100000"/>
-              </a:lnSpc>
-              <a:spcBef>
-                <a:spcPct val="0"/>
-              </a:spcBef>
-              <a:spcAft>
-                <a:spcPts val="0"/>
-              </a:spcAft>
-              <a:buClrTx/>
-              <a:buSzTx/>
-              <a:buFontTx/>
-              <a:buNone/>
-              <a:tabLst/>
-              <a:defRPr/>
-            </a:pPr>
-            <a:r>
-              <a:rPr kumimoji="0" lang="en-IN" sz="3200" i="0" u="none" strike="noStrike" kern="1200" cap="none" spc="0" normalizeH="0" baseline="0" noProof="0" dirty="0">
-                <a:ln>
-                  <a:noFill/>
-                </a:ln>
-                <a:solidFill>
-                  <a:schemeClr val="tx2"/>
-                </a:solidFill>
-                <a:uLnTx/>
-                <a:uFillTx/>
-                <a:ea typeface="+mj-ea"/>
-                <a:cs typeface="+mj-cs"/>
-              </a:rPr>
-              <a:t>Login Page</a:t>
-            </a:r>
-          </a:p>
-        </p:txBody>
-      </p:sp>
     </p:spTree>
   </p:cSld>
   <p:clrMapOvr>
@@ -5465,7 +5470,7 @@
         <p:spPr>
           <a:xfrm>
             <a:off x="720090" y="317233"/>
-            <a:ext cx="12961621" cy="1098929"/>
+            <a:ext cx="12961621" cy="1024087"/>
           </a:xfrm>
         </p:spPr>
         <p:txBody>
@@ -5483,7 +5488,7 @@
       </p:sp>
       <p:pic>
         <p:nvPicPr>
-          <p:cNvPr id="1028" name="Picture 4" descr="C:\Users\hp\Desktop\Home.PNG"/>
+          <p:cNvPr id="2050" name="Picture 2" descr="C:\Users\hp\Desktop\home1.PNG"/>
           <p:cNvPicPr>
             <a:picLocks noGrp="1" noChangeAspect="1" noChangeArrowheads="1"/>
           </p:cNvPicPr>
@@ -5500,8 +5505,8 @@
         </p:blipFill>
         <p:spPr bwMode="auto">
           <a:xfrm>
-            <a:off x="4557694" y="1116791"/>
-            <a:ext cx="9154632" cy="6201607"/>
+            <a:off x="4700570" y="1370977"/>
+            <a:ext cx="9358378" cy="5804545"/>
           </a:xfrm>
           <a:prstGeom prst="rect">
             <a:avLst/>
@@ -5511,7 +5516,7 @@
       </p:pic>
       <p:sp>
         <p:nvSpPr>
-          <p:cNvPr id="7" name="Title 2"/>
+          <p:cNvPr id="5" name="Title 2"/>
           <p:cNvSpPr txBox="1">
             <a:spLocks/>
           </p:cNvSpPr>
@@ -5528,7 +5533,7 @@
         </p:spPr>
         <p:txBody>
           <a:bodyPr vert="horz" lIns="127553" tIns="63777" rIns="127553" bIns="63777" rtlCol="0" anchor="ctr">
-            <a:normAutofit lnSpcReduction="10000"/>
+            <a:normAutofit/>
             <a:scene3d>
               <a:camera prst="orthographicFront"/>
               <a:lightRig rig="soft" dir="t"/>
@@ -5569,7 +5574,7 @@
                 <a:ea typeface="+mj-ea"/>
                 <a:cs typeface="+mj-cs"/>
               </a:rPr>
-              <a:t>View Patient  Page</a:t>
+              <a:t>Login Page</a:t>
             </a:r>
           </a:p>
         </p:txBody>
@@ -5612,7 +5617,7 @@
         <p:spPr>
           <a:xfrm>
             <a:off x="720090" y="317233"/>
-            <a:ext cx="12961621" cy="1071811"/>
+            <a:ext cx="12961621" cy="1098929"/>
           </a:xfrm>
         </p:spPr>
         <p:txBody>
@@ -5630,7 +5635,7 @@
       </p:sp>
       <p:pic>
         <p:nvPicPr>
-          <p:cNvPr id="3074" name="Picture 2"/>
+          <p:cNvPr id="1028" name="Picture 4" descr="C:\Users\hp\Desktop\Home.PNG"/>
           <p:cNvPicPr>
             <a:picLocks noGrp="1" noChangeAspect="1" noChangeArrowheads="1"/>
           </p:cNvPicPr>
@@ -5647,25 +5652,18 @@
         </p:blipFill>
         <p:spPr bwMode="auto">
           <a:xfrm>
-            <a:off x="4700588" y="1031855"/>
-            <a:ext cx="8980487" cy="6357982"/>
+            <a:off x="4557694" y="1116791"/>
+            <a:ext cx="9154632" cy="6201607"/>
           </a:xfrm>
           <a:prstGeom prst="rect">
             <a:avLst/>
           </a:prstGeom>
           <a:noFill/>
-          <a:ln w="9525">
-            <a:noFill/>
-            <a:miter lim="800000"/>
-            <a:headEnd/>
-            <a:tailEnd/>
-          </a:ln>
-          <a:effectLst/>
         </p:spPr>
       </p:pic>
       <p:sp>
         <p:nvSpPr>
-          <p:cNvPr id="5" name="Title 2"/>
+          <p:cNvPr id="7" name="Title 2"/>
           <p:cNvSpPr txBox="1">
             <a:spLocks/>
           </p:cNvSpPr>
@@ -5711,21 +5709,6 @@
               <a:defRPr/>
             </a:pPr>
             <a:r>
-              <a:rPr kumimoji="0" lang="en-IN" sz="3200" i="0" u="none" strike="noStrike" kern="1200" cap="none" spc="0" normalizeH="0" baseline="0" noProof="0" dirty="0" err="1">
-                <a:ln>
-                  <a:noFill/>
-                </a:ln>
-                <a:solidFill>
-                  <a:schemeClr val="tx2"/>
-                </a:solidFill>
-                <a:uLnTx/>
-                <a:uFillTx/>
-                <a:ea typeface="+mj-ea"/>
-                <a:cs typeface="+mj-cs"/>
-              </a:rPr>
-              <a:t>SearchPatient</a:t>
-            </a:r>
-            <a:r>
               <a:rPr kumimoji="0" lang="en-IN" sz="3200" i="0" u="none" strike="noStrike" kern="1200" cap="none" spc="0" normalizeH="0" baseline="0" noProof="0" dirty="0">
                 <a:ln>
                   <a:noFill/>
@@ -5738,7 +5721,7 @@
                 <a:ea typeface="+mj-ea"/>
                 <a:cs typeface="+mj-cs"/>
               </a:rPr>
-              <a:t>  Page</a:t>
+              <a:t>View Patient  Page</a:t>
             </a:r>
           </a:p>
         </p:txBody>
@@ -5785,11 +5768,13 @@
           </a:xfrm>
         </p:spPr>
         <p:txBody>
-          <a:bodyPr/>
-          <a:lstStyle/>
-          <a:p>
-            <a:r>
-              <a:rPr lang="en-IN" dirty="0"/>
+          <a:bodyPr>
+            <a:normAutofit/>
+          </a:bodyPr>
+          <a:lstStyle/>
+          <a:p>
+            <a:r>
+              <a:rPr lang="en-IN" sz="5400" dirty="0"/>
               <a:t>Desktop View</a:t>
             </a:r>
           </a:p>
@@ -5797,7 +5782,7 @@
       </p:sp>
       <p:pic>
         <p:nvPicPr>
-          <p:cNvPr id="4098" name="Picture 2"/>
+          <p:cNvPr id="3074" name="Picture 2"/>
           <p:cNvPicPr>
             <a:picLocks noGrp="1" noChangeAspect="1" noChangeArrowheads="1"/>
           </p:cNvPicPr>
@@ -5814,8 +5799,8 @@
         </p:blipFill>
         <p:spPr bwMode="auto">
           <a:xfrm>
-            <a:off x="4557693" y="1174730"/>
-            <a:ext cx="9123381" cy="6215106"/>
+            <a:off x="4700588" y="1031855"/>
+            <a:ext cx="8980487" cy="6357982"/>
           </a:xfrm>
           <a:prstGeom prst="rect">
             <a:avLst/>
@@ -5878,6 +5863,21 @@
               <a:defRPr/>
             </a:pPr>
             <a:r>
+              <a:rPr kumimoji="0" lang="en-IN" sz="3200" i="0" u="none" strike="noStrike" kern="1200" cap="none" spc="0" normalizeH="0" baseline="0" noProof="0" dirty="0" err="1">
+                <a:ln>
+                  <a:noFill/>
+                </a:ln>
+                <a:solidFill>
+                  <a:schemeClr val="tx2"/>
+                </a:solidFill>
+                <a:uLnTx/>
+                <a:uFillTx/>
+                <a:ea typeface="+mj-ea"/>
+                <a:cs typeface="+mj-cs"/>
+              </a:rPr>
+              <a:t>SearchPatient</a:t>
+            </a:r>
+            <a:r>
               <a:rPr kumimoji="0" lang="en-IN" sz="3200" i="0" u="none" strike="noStrike" kern="1200" cap="none" spc="0" normalizeH="0" baseline="0" noProof="0" dirty="0">
                 <a:ln>
                   <a:noFill/>
@@ -5890,7 +5890,7 @@
                 <a:ea typeface="+mj-ea"/>
                 <a:cs typeface="+mj-cs"/>
               </a:rPr>
-              <a:t>Add Patient  Page</a:t>
+              <a:t>  Page</a:t>
             </a:r>
           </a:p>
         </p:txBody>
@@ -5933,13 +5933,11 @@
         <p:spPr>
           <a:xfrm>
             <a:off x="720090" y="317233"/>
-            <a:ext cx="12961621" cy="1000373"/>
-          </a:xfrm>
-        </p:spPr>
-        <p:txBody>
-          <a:bodyPr>
-            <a:normAutofit fontScale="90000"/>
-          </a:bodyPr>
+            <a:ext cx="12961621" cy="1071811"/>
+          </a:xfrm>
+        </p:spPr>
+        <p:txBody>
+          <a:bodyPr/>
           <a:lstStyle/>
           <a:p>
             <a:r>
@@ -5951,7 +5949,7 @@
       </p:sp>
       <p:pic>
         <p:nvPicPr>
-          <p:cNvPr id="5122" name="Picture 2"/>
+          <p:cNvPr id="4098" name="Picture 2"/>
           <p:cNvPicPr>
             <a:picLocks noGrp="1" noChangeAspect="1" noChangeArrowheads="1"/>
           </p:cNvPicPr>
@@ -5968,8 +5966,8 @@
         </p:blipFill>
         <p:spPr bwMode="auto">
           <a:xfrm>
-            <a:off x="4057650" y="1103292"/>
-            <a:ext cx="9623425" cy="6143668"/>
+            <a:off x="4557693" y="1174730"/>
+            <a:ext cx="9123381" cy="6215106"/>
           </a:xfrm>
           <a:prstGeom prst="rect">
             <a:avLst/>
@@ -6044,7 +6042,7 @@
                 <a:ea typeface="+mj-ea"/>
                 <a:cs typeface="+mj-cs"/>
               </a:rPr>
-              <a:t>View Patient’s Record  Page</a:t>
+              <a:t>Add Patient  Page</a:t>
             </a:r>
           </a:p>
         </p:txBody>
@@ -6086,30 +6084,32 @@
         </p:nvSpPr>
         <p:spPr>
           <a:xfrm>
-            <a:off x="485728" y="246036"/>
-            <a:ext cx="12961621" cy="1071569"/>
+            <a:off x="720090" y="317233"/>
+            <a:ext cx="12961621" cy="1000373"/>
           </a:xfrm>
         </p:spPr>
         <p:txBody>
           <a:bodyPr>
-            <a:normAutofit/>
+            <a:normAutofit fontScale="90000"/>
           </a:bodyPr>
           <a:lstStyle/>
           <a:p>
             <a:r>
-              <a:rPr lang="en-IN" sz="5400" dirty="0"/>
-              <a:t>Mobile View </a:t>
+              <a:rPr lang="en-IN" dirty="0"/>
+              <a:t>Desktop View</a:t>
             </a:r>
           </a:p>
         </p:txBody>
       </p:sp>
       <p:pic>
         <p:nvPicPr>
-          <p:cNvPr id="6152" name="Picture 8" descr="C:\Users\hp\Downloads\(Health care) Flow chart for Mobile Page.png"/>
+          <p:cNvPr id="5122" name="Picture 2"/>
           <p:cNvPicPr>
-            <a:picLocks noChangeAspect="1" noChangeArrowheads="1"/>
+            <a:picLocks noGrp="1" noChangeAspect="1" noChangeArrowheads="1"/>
           </p:cNvPicPr>
-          <p:nvPr/>
+          <p:nvPr>
+            <p:ph idx="1"/>
+          </p:nvPr>
         </p:nvPicPr>
         <p:blipFill>
           <a:blip r:embed="rId2"/>
@@ -6120,15 +6120,87 @@
         </p:blipFill>
         <p:spPr bwMode="auto">
           <a:xfrm>
-            <a:off x="4986322" y="246036"/>
-            <a:ext cx="6500858" cy="7429552"/>
+            <a:off x="4057650" y="1103292"/>
+            <a:ext cx="9623425" cy="6143668"/>
           </a:xfrm>
           <a:prstGeom prst="rect">
             <a:avLst/>
           </a:prstGeom>
           <a:noFill/>
+          <a:ln w="9525">
+            <a:noFill/>
+            <a:miter lim="800000"/>
+            <a:headEnd/>
+            <a:tailEnd/>
+          </a:ln>
+          <a:effectLst/>
         </p:spPr>
       </p:pic>
+      <p:sp>
+        <p:nvSpPr>
+          <p:cNvPr id="5" name="Title 2"/>
+          <p:cNvSpPr txBox="1">
+            <a:spLocks/>
+          </p:cNvSpPr>
+          <p:nvPr/>
+        </p:nvSpPr>
+        <p:spPr>
+          <a:xfrm>
+            <a:off x="557166" y="5461010"/>
+            <a:ext cx="3643338" cy="1071570"/>
+          </a:xfrm>
+          <a:prstGeom prst="rect">
+            <a:avLst/>
+          </a:prstGeom>
+        </p:spPr>
+        <p:txBody>
+          <a:bodyPr vert="horz" lIns="127553" tIns="63777" rIns="127553" bIns="63777" rtlCol="0" anchor="ctr">
+            <a:normAutofit lnSpcReduction="10000"/>
+            <a:scene3d>
+              <a:camera prst="orthographicFront"/>
+              <a:lightRig rig="soft" dir="t"/>
+            </a:scene3d>
+            <a:sp3d prstMaterial="softEdge">
+              <a:bevelT w="25400" h="25400"/>
+            </a:sp3d>
+          </a:bodyPr>
+          <a:lstStyle/>
+          <a:p>
+            <a:pPr marL="0" marR="0" lvl="0" indent="0" algn="l" defTabSz="914400" rtl="0" eaLnBrk="1" fontAlgn="auto" latinLnBrk="0" hangingPunct="1">
+              <a:lnSpc>
+                <a:spcPct val="100000"/>
+              </a:lnSpc>
+              <a:spcBef>
+                <a:spcPct val="0"/>
+              </a:spcBef>
+              <a:spcAft>
+                <a:spcPts val="0"/>
+              </a:spcAft>
+              <a:buClrTx/>
+              <a:buSzTx/>
+              <a:buFontTx/>
+              <a:buNone/>
+              <a:tabLst/>
+              <a:defRPr/>
+            </a:pPr>
+            <a:r>
+              <a:rPr kumimoji="0" lang="en-IN" sz="3200" i="0" u="none" strike="noStrike" kern="1200" cap="none" spc="0" normalizeH="0" baseline="0" noProof="0" dirty="0">
+                <a:ln>
+                  <a:noFill/>
+                </a:ln>
+                <a:solidFill>
+                  <a:schemeClr val="tx2"/>
+                </a:solidFill>
+                <a:uLnTx/>
+                <a:uFillTx/>
+                <a:ea typeface="+mj-ea"/>
+                <a:cs typeface="+mj-cs"/>
+              </a:rPr>
+              <a:t>View Patient’s Record  Page</a:t>
+            </a:r>
+          </a:p>
+        </p:txBody>
+      </p:sp>
     </p:spTree>
   </p:cSld>
   <p:clrMapOvr>
@@ -6156,18 +6228,18 @@
       </p:grpSpPr>
       <p:sp>
         <p:nvSpPr>
-          <p:cNvPr id="2" name="Content Placeholder 1"/>
-          <p:cNvSpPr>
-            <a:spLocks noGrp="1"/>
-          </p:cNvSpPr>
-          <p:nvPr>
-            <p:ph idx="1"/>
+          <p:cNvPr id="3" name="Title 2"/>
+          <p:cNvSpPr>
+            <a:spLocks noGrp="1"/>
+          </p:cNvSpPr>
+          <p:nvPr>
+            <p:ph type="title"/>
           </p:nvPr>
         </p:nvSpPr>
         <p:spPr>
           <a:xfrm>
-            <a:off x="720090" y="1674797"/>
-            <a:ext cx="12961621" cy="4000528"/>
+            <a:off x="485728" y="246036"/>
+            <a:ext cx="12961621" cy="1071569"/>
           </a:xfrm>
         </p:spPr>
         <p:txBody>
@@ -6176,111 +6248,39 @@
           </a:bodyPr>
           <a:lstStyle/>
           <a:p>
-            <a:pPr marL="667416" indent="-514350">
-              <a:buNone/>
-            </a:pPr>
-            <a:r>
-              <a:rPr lang="en-IN" sz="3600" dirty="0"/>
-              <a:t>Frontend </a:t>
-            </a:r>
-            <a:r>
-              <a:rPr lang="en-IN" sz="3200" dirty="0"/>
-              <a:t>   </a:t>
-            </a:r>
-          </a:p>
-          <a:p>
-            <a:pPr>
-              <a:buFont typeface="Arial" pitchFamily="34" charset="0"/>
-              <a:buChar char="•"/>
-            </a:pPr>
-            <a:r>
-              <a:rPr lang="en-IN" sz="2800" dirty="0"/>
-              <a:t>Responsive Design : Bootstrap, JavaScript</a:t>
-            </a:r>
-          </a:p>
-          <a:p>
-            <a:pPr>
-              <a:buFont typeface="Arial" pitchFamily="34" charset="0"/>
-              <a:buChar char="•"/>
-            </a:pPr>
-            <a:r>
-              <a:rPr lang="en-IN" sz="2800" dirty="0"/>
-              <a:t>Client-Server request : AJAX   </a:t>
-            </a:r>
-          </a:p>
-          <a:p>
-            <a:pPr>
-              <a:buFont typeface="Arial" pitchFamily="34" charset="0"/>
-              <a:buChar char="•"/>
-            </a:pPr>
-            <a:r>
-              <a:rPr lang="en-IN" sz="2800" dirty="0"/>
-              <a:t>Authentication : JWT(JSON Web Token)    </a:t>
-            </a:r>
-          </a:p>
-          <a:p>
-            <a:pPr>
-              <a:buFont typeface="Arial" pitchFamily="34" charset="0"/>
-              <a:buChar char="•"/>
-            </a:pPr>
-            <a:r>
-              <a:rPr lang="en-IN" sz="2800" dirty="0"/>
-              <a:t>Deployment : GitHub</a:t>
-            </a:r>
-          </a:p>
-          <a:p>
-            <a:pPr>
-              <a:buNone/>
-            </a:pPr>
-            <a:r>
-              <a:rPr lang="en-IN" sz="2800" dirty="0"/>
-              <a:t>  </a:t>
-            </a:r>
-          </a:p>
-          <a:p>
-            <a:pPr>
-              <a:buFont typeface="Arial" pitchFamily="34" charset="0"/>
-              <a:buChar char="•"/>
-            </a:pPr>
-            <a:endParaRPr lang="en-IN" sz="2400" dirty="0"/>
-          </a:p>
-          <a:p>
-            <a:pPr>
-              <a:buNone/>
-            </a:pPr>
-            <a:endParaRPr lang="en-IN" sz="2400" dirty="0"/>
-          </a:p>
-        </p:txBody>
-      </p:sp>
-      <p:sp>
-        <p:nvSpPr>
-          <p:cNvPr id="3" name="Title 2"/>
-          <p:cNvSpPr>
-            <a:spLocks noGrp="1"/>
-          </p:cNvSpPr>
-          <p:nvPr>
-            <p:ph type="title"/>
-          </p:nvPr>
-        </p:nvSpPr>
-        <p:spPr>
-          <a:xfrm>
-            <a:off x="720090" y="317233"/>
-            <a:ext cx="12961621" cy="1143249"/>
-          </a:xfrm>
-        </p:spPr>
-        <p:txBody>
-          <a:bodyPr>
-            <a:normAutofit/>
-          </a:bodyPr>
-          <a:lstStyle/>
-          <a:p>
             <a:r>
               <a:rPr lang="en-IN" sz="5400" dirty="0"/>
-              <a:t>Tools &amp; Technologies Used</a:t>
-            </a:r>
-          </a:p>
-        </p:txBody>
-      </p:sp>
+              <a:t>Mobile View </a:t>
+            </a:r>
+          </a:p>
+        </p:txBody>
+      </p:sp>
+      <p:pic>
+        <p:nvPicPr>
+          <p:cNvPr id="6152" name="Picture 8" descr="C:\Users\hp\Downloads\(Health care) Flow chart for Mobile Page.png"/>
+          <p:cNvPicPr>
+            <a:picLocks noChangeAspect="1" noChangeArrowheads="1"/>
+          </p:cNvPicPr>
+          <p:nvPr/>
+        </p:nvPicPr>
+        <p:blipFill>
+          <a:blip r:embed="rId2"/>
+          <a:srcRect/>
+          <a:stretch>
+            <a:fillRect/>
+          </a:stretch>
+        </p:blipFill>
+        <p:spPr bwMode="auto">
+          <a:xfrm>
+            <a:off x="4986322" y="246036"/>
+            <a:ext cx="6500858" cy="7429552"/>
+          </a:xfrm>
+          <a:prstGeom prst="rect">
+            <a:avLst/>
+          </a:prstGeom>
+          <a:noFill/>
+        </p:spPr>
+      </p:pic>
     </p:spTree>
   </p:cSld>
   <p:clrMapOvr>

</xml_diff>

<commit_message>
update : ppt by adding demo page
</commit_message>
<xml_diff>
--- a/doc/HEALTH_N_CARE.pptx
+++ b/doc/HEALTH_N_CARE.pptx
@@ -18,6 +18,7 @@
     <p:sldId id="266" r:id="rId12"/>
     <p:sldId id="267" r:id="rId13"/>
     <p:sldId id="271" r:id="rId14"/>
+    <p:sldId id="272" r:id="rId15"/>
   </p:sldIdLst>
   <p:sldSz cx="14401800" cy="7921625"/>
   <p:notesSz cx="6858000" cy="9144000"/>
@@ -5251,10 +5252,12 @@
           <a:bodyPr/>
           <a:lstStyle/>
           <a:p>
-            <a:r>
-              <a:rPr lang="en-IN" dirty="0"/>
-              <a:t>                Thank You!!!!</a:t>
-            </a:r>
+            <a:pPr algn="ctr"/>
+            <a:r>
+              <a:rPr lang="en-IN"/>
+              <a:t>DEMO</a:t>
+            </a:r>
+            <a:endParaRPr lang="en-IN" dirty="0"/>
           </a:p>
         </p:txBody>
       </p:sp>
@@ -5262,6 +5265,63 @@
     <p:extLst>
       <p:ext uri="{BB962C8B-B14F-4D97-AF65-F5344CB8AC3E}">
         <p14:creationId xmlns:p14="http://schemas.microsoft.com/office/powerpoint/2010/main" val="1290413559"/>
+      </p:ext>
+    </p:extLst>
+  </p:cSld>
+  <p:clrMapOvr>
+    <a:masterClrMapping/>
+  </p:clrMapOvr>
+</p:sld>
+</file>
+
+<file path=ppt/slides/slide14.xml><?xml version="1.0" encoding="utf-8"?>
+<p:sld xmlns:a="http://schemas.openxmlformats.org/drawingml/2006/main" xmlns:r="http://schemas.openxmlformats.org/officeDocument/2006/relationships" xmlns:p="http://schemas.openxmlformats.org/presentationml/2006/main">
+  <p:cSld>
+    <p:spTree>
+      <p:nvGrpSpPr>
+        <p:cNvPr id="1" name=""/>
+        <p:cNvGrpSpPr/>
+        <p:nvPr/>
+      </p:nvGrpSpPr>
+      <p:grpSpPr>
+        <a:xfrm>
+          <a:off x="0" y="0"/>
+          <a:ext cx="0" cy="0"/>
+          <a:chOff x="0" y="0"/>
+          <a:chExt cx="0" cy="0"/>
+        </a:xfrm>
+      </p:grpSpPr>
+      <p:sp>
+        <p:nvSpPr>
+          <p:cNvPr id="3" name="Title 2"/>
+          <p:cNvSpPr>
+            <a:spLocks noGrp="1"/>
+          </p:cNvSpPr>
+          <p:nvPr>
+            <p:ph type="title"/>
+          </p:nvPr>
+        </p:nvSpPr>
+        <p:spPr>
+          <a:xfrm>
+            <a:off x="720090" y="2103424"/>
+            <a:ext cx="12961621" cy="1500198"/>
+          </a:xfrm>
+        </p:spPr>
+        <p:txBody>
+          <a:bodyPr/>
+          <a:lstStyle/>
+          <a:p>
+            <a:r>
+              <a:rPr lang="en-IN" dirty="0"/>
+              <a:t>                Thank You!!!!</a:t>
+            </a:r>
+          </a:p>
+        </p:txBody>
+      </p:sp>
+    </p:spTree>
+    <p:extLst>
+      <p:ext uri="{BB962C8B-B14F-4D97-AF65-F5344CB8AC3E}">
+        <p14:creationId xmlns:p14="http://schemas.microsoft.com/office/powerpoint/2010/main" val="2145123803"/>
       </p:ext>
     </p:extLst>
   </p:cSld>

</xml_diff>